<commit_message>
all model training done
</commit_message>
<xml_diff>
--- a/CFM_presentation.pptx
+++ b/CFM_presentation.pptx
@@ -5,7 +5,7 @@
     <p:sldMasterId id="2147483663" r:id="rId1"/>
   </p:sldMasterIdLst>
   <p:notesMasterIdLst>
-    <p:notesMasterId r:id="rId15"/>
+    <p:notesMasterId r:id="rId14"/>
   </p:notesMasterIdLst>
   <p:sldIdLst>
     <p:sldId id="256" r:id="rId2"/>
@@ -17,10 +17,9 @@
     <p:sldId id="266" r:id="rId8"/>
     <p:sldId id="267" r:id="rId9"/>
     <p:sldId id="268" r:id="rId10"/>
-    <p:sldId id="269" r:id="rId11"/>
-    <p:sldId id="259" r:id="rId12"/>
-    <p:sldId id="260" r:id="rId13"/>
-    <p:sldId id="261" r:id="rId14"/>
+    <p:sldId id="270" r:id="rId11"/>
+    <p:sldId id="271" r:id="rId12"/>
+    <p:sldId id="272" r:id="rId13"/>
   </p:sldIdLst>
   <p:sldSz cx="12192000" cy="6858000"/>
   <p:notesSz cx="6858000" cy="9144000"/>
@@ -1131,11 +1130,11 @@
       <dgm:spPr/>
     </dgm:pt>
     <dgm:pt modelId="{FC9E9FAD-2179-4CF6-B9BD-238072CACD67}" type="pres">
-      <dgm:prSet presAssocID="{C750E5B8-098C-4271-B16B-2036398E3EC1}" presName="bgRect" presStyleLbl="bgShp" presStyleIdx="2" presStyleCnt="3"/>
+      <dgm:prSet presAssocID="{C750E5B8-098C-4271-B16B-2036398E3EC1}" presName="bgRect" presStyleLbl="bgShp" presStyleIdx="2" presStyleCnt="3" custLinFactNeighborX="428" custLinFactNeighborY="-21918"/>
       <dgm:spPr/>
     </dgm:pt>
     <dgm:pt modelId="{33350400-92D9-4C04-B105-5F64BA8FBCD7}" type="pres">
-      <dgm:prSet presAssocID="{C750E5B8-098C-4271-B16B-2036398E3EC1}" presName="iconRect" presStyleLbl="node1" presStyleIdx="2" presStyleCnt="3"/>
+      <dgm:prSet presAssocID="{C750E5B8-098C-4271-B16B-2036398E3EC1}" presName="iconRect" presStyleLbl="node1" presStyleIdx="2" presStyleCnt="3" custLinFactNeighborX="-7666" custLinFactNeighborY="-40032"/>
       <dgm:spPr>
         <a:blipFill>
           <a:blip xmlns:r="http://schemas.openxmlformats.org/officeDocument/2006/relationships" r:embed="rId5">
@@ -1164,7 +1163,7 @@
       <dgm:spPr/>
     </dgm:pt>
     <dgm:pt modelId="{805E169B-D637-4906-8985-BD7791EA5368}" type="pres">
-      <dgm:prSet presAssocID="{C750E5B8-098C-4271-B16B-2036398E3EC1}" presName="parTx" presStyleLbl="revTx" presStyleIdx="2" presStyleCnt="3" custScaleX="110344" custScaleY="161252" custLinFactNeighborX="-2812" custLinFactNeighborY="4084">
+      <dgm:prSet presAssocID="{C750E5B8-098C-4271-B16B-2036398E3EC1}" presName="parTx" presStyleLbl="revTx" presStyleIdx="2" presStyleCnt="3" custScaleX="111442" custScaleY="161252" custLinFactNeighborX="-824" custLinFactNeighborY="-19676">
         <dgm:presLayoutVars>
           <dgm:chMax val="0"/>
           <dgm:chPref val="0"/>
@@ -1224,7 +1223,7 @@
       </dsp:nvSpPr>
       <dsp:spPr>
         <a:xfrm>
-          <a:off x="-17068" y="0"/>
+          <a:off x="-24653" y="0"/>
           <a:ext cx="3825560" cy="825709"/>
         </a:xfrm>
         <a:prstGeom prst="roundRect">
@@ -1266,7 +1265,7 @@
       </dsp:nvSpPr>
       <dsp:spPr>
         <a:xfrm>
-          <a:off x="232708" y="190115"/>
+          <a:off x="225123" y="190115"/>
           <a:ext cx="454140" cy="454140"/>
         </a:xfrm>
         <a:prstGeom prst="rect">
@@ -1323,7 +1322,7 @@
       </dsp:nvSpPr>
       <dsp:spPr>
         <a:xfrm>
-          <a:off x="936625" y="4330"/>
+          <a:off x="929041" y="4330"/>
           <a:ext cx="2763095" cy="770241"/>
         </a:xfrm>
         <a:prstGeom prst="rect">
@@ -1373,7 +1372,7 @@
         </a:p>
       </dsp:txBody>
       <dsp:txXfrm>
-        <a:off x="936625" y="4330"/>
+        <a:off x="929041" y="4330"/>
         <a:ext cx="2763095" cy="770241"/>
       </dsp:txXfrm>
     </dsp:sp>
@@ -1384,7 +1383,7 @@
       </dsp:nvSpPr>
       <dsp:spPr>
         <a:xfrm>
-          <a:off x="-17068" y="1030212"/>
+          <a:off x="-24653" y="1030212"/>
           <a:ext cx="3825560" cy="825709"/>
         </a:xfrm>
         <a:prstGeom prst="roundRect">
@@ -1426,7 +1425,7 @@
       </dsp:nvSpPr>
       <dsp:spPr>
         <a:xfrm>
-          <a:off x="232708" y="1215996"/>
+          <a:off x="225123" y="1215996"/>
           <a:ext cx="454140" cy="454140"/>
         </a:xfrm>
         <a:prstGeom prst="rect">
@@ -1483,7 +1482,7 @@
       </dsp:nvSpPr>
       <dsp:spPr>
         <a:xfrm>
-          <a:off x="871665" y="1052449"/>
+          <a:off x="864080" y="1052449"/>
           <a:ext cx="2763095" cy="770241"/>
         </a:xfrm>
         <a:prstGeom prst="rect">
@@ -1533,7 +1532,7 @@
         </a:p>
       </dsp:txBody>
       <dsp:txXfrm>
-        <a:off x="871665" y="1052449"/>
+        <a:off x="864080" y="1052449"/>
         <a:ext cx="2763095" cy="770241"/>
       </dsp:txXfrm>
     </dsp:sp>
@@ -1544,7 +1543,7 @@
       </dsp:nvSpPr>
       <dsp:spPr>
         <a:xfrm>
-          <a:off x="-17068" y="2291988"/>
+          <a:off x="-8279" y="2111009"/>
           <a:ext cx="3825560" cy="825709"/>
         </a:xfrm>
         <a:prstGeom prst="roundRect">
@@ -1586,7 +1585,7 @@
       </dsp:nvSpPr>
       <dsp:spPr>
         <a:xfrm>
-          <a:off x="232708" y="2477772"/>
+          <a:off x="190309" y="2295971"/>
           <a:ext cx="454140" cy="454140"/>
         </a:xfrm>
         <a:prstGeom prst="rect">
@@ -1643,8 +1642,8 @@
       </dsp:nvSpPr>
       <dsp:spPr>
         <a:xfrm>
-          <a:off x="716020" y="2060424"/>
-          <a:ext cx="3048909" cy="1242030"/>
+          <a:off x="748196" y="1904540"/>
+          <a:ext cx="3079248" cy="1242030"/>
         </a:xfrm>
         <a:prstGeom prst="rect">
           <a:avLst/>
@@ -1693,8 +1692,8 @@
         </a:p>
       </dsp:txBody>
       <dsp:txXfrm>
-        <a:off x="716020" y="2060424"/>
-        <a:ext cx="3048909" cy="1242030"/>
+        <a:off x="748196" y="1904540"/>
+        <a:ext cx="3079248" cy="1242030"/>
       </dsp:txXfrm>
     </dsp:sp>
   </dsp:spTree>
@@ -3111,7 +3110,7 @@
           <a:p>
             <a:fld id="{6F1FF179-BE0B-4630-BBE9-1659BFF4548F}" type="datetimeFigureOut">
               <a:rPr lang="en-US" smtClean="0"/>
-              <a:t>6/1/2025</a:t>
+              <a:t>6/2/2025</a:t>
             </a:fld>
             <a:endParaRPr lang="en-US"/>
           </a:p>
@@ -3470,7 +3469,7 @@
         <p:cNvPr id="1" name="">
           <a:extLst>
             <a:ext uri="{FF2B5EF4-FFF2-40B4-BE49-F238E27FC236}">
-              <a16:creationId xmlns:a16="http://schemas.microsoft.com/office/drawing/2014/main" id="{CF5A6A83-5557-8F7A-2579-CC5424639BE5}"/>
+              <a16:creationId xmlns:a16="http://schemas.microsoft.com/office/drawing/2014/main" id="{14F2A95A-E317-89A6-4E99-E3E8A76734E8}"/>
             </a:ext>
           </a:extLst>
         </p:cNvPr>
@@ -3490,7 +3489,7 @@
           <p:cNvPr id="2" name="Slide Image Placeholder 1">
             <a:extLst>
               <a:ext uri="{FF2B5EF4-FFF2-40B4-BE49-F238E27FC236}">
-                <a16:creationId xmlns:a16="http://schemas.microsoft.com/office/drawing/2014/main" id="{F20176C2-17C5-9BFA-2CC1-F3AD8927EA21}"/>
+                <a16:creationId xmlns:a16="http://schemas.microsoft.com/office/drawing/2014/main" id="{395CF0AB-8600-0986-DAC6-8AC1C9F2ED25}"/>
               </a:ext>
             </a:extLst>
           </p:cNvPr>
@@ -3508,7 +3507,7 @@
           <p:cNvPr id="3" name="Notes Placeholder 2">
             <a:extLst>
               <a:ext uri="{FF2B5EF4-FFF2-40B4-BE49-F238E27FC236}">
-                <a16:creationId xmlns:a16="http://schemas.microsoft.com/office/drawing/2014/main" id="{750946D2-5BBC-8E15-7BCA-EF34C3FACCA6}"/>
+                <a16:creationId xmlns:a16="http://schemas.microsoft.com/office/drawing/2014/main" id="{CF9EBAD9-52D2-5351-D3D2-4FD6DB124B8A}"/>
               </a:ext>
             </a:extLst>
           </p:cNvPr>
@@ -3533,7 +3532,7 @@
           <p:cNvPr id="4" name="Slide Number Placeholder 3">
             <a:extLst>
               <a:ext uri="{FF2B5EF4-FFF2-40B4-BE49-F238E27FC236}">
-                <a16:creationId xmlns:a16="http://schemas.microsoft.com/office/drawing/2014/main" id="{5A459EF0-9C1C-A196-C408-92F877A46A6C}"/>
+                <a16:creationId xmlns:a16="http://schemas.microsoft.com/office/drawing/2014/main" id="{8058733B-009A-C246-7A96-8D554297AABB}"/>
               </a:ext>
             </a:extLst>
           </p:cNvPr>
@@ -3560,7 +3559,7 @@
     </p:spTree>
     <p:extLst>
       <p:ext uri="{BB962C8B-B14F-4D97-AF65-F5344CB8AC3E}">
-        <p14:creationId xmlns:p14="http://schemas.microsoft.com/office/powerpoint/2010/main" val="4155333957"/>
+        <p14:creationId xmlns:p14="http://schemas.microsoft.com/office/powerpoint/2010/main" val="886084623"/>
       </p:ext>
     </p:extLst>
   </p:cSld>
@@ -3575,7 +3574,13 @@
   <p:cSld>
     <p:spTree>
       <p:nvGrpSpPr>
-        <p:cNvPr id="1" name=""/>
+        <p:cNvPr id="1" name="">
+          <a:extLst>
+            <a:ext uri="{FF2B5EF4-FFF2-40B4-BE49-F238E27FC236}">
+              <a16:creationId xmlns:a16="http://schemas.microsoft.com/office/drawing/2014/main" id="{DAC891FF-EA1A-5361-0707-87B74E90B922}"/>
+            </a:ext>
+          </a:extLst>
+        </p:cNvPr>
         <p:cNvGrpSpPr/>
         <p:nvPr/>
       </p:nvGrpSpPr>
@@ -3589,7 +3594,13 @@
       </p:grpSpPr>
       <p:sp>
         <p:nvSpPr>
-          <p:cNvPr id="2" name="Slide Image Placeholder 1"/>
+          <p:cNvPr id="2" name="Slide Image Placeholder 1">
+            <a:extLst>
+              <a:ext uri="{FF2B5EF4-FFF2-40B4-BE49-F238E27FC236}">
+                <a16:creationId xmlns:a16="http://schemas.microsoft.com/office/drawing/2014/main" id="{5EB9E600-13EC-9891-8C21-610D811628B4}"/>
+              </a:ext>
+            </a:extLst>
+          </p:cNvPr>
           <p:cNvSpPr>
             <a:spLocks noGrp="1" noRot="1" noChangeAspect="1"/>
           </p:cNvSpPr>
@@ -3601,7 +3612,13 @@
       </p:sp>
       <p:sp>
         <p:nvSpPr>
-          <p:cNvPr id="3" name="Notes Placeholder 2"/>
+          <p:cNvPr id="3" name="Notes Placeholder 2">
+            <a:extLst>
+              <a:ext uri="{FF2B5EF4-FFF2-40B4-BE49-F238E27FC236}">
+                <a16:creationId xmlns:a16="http://schemas.microsoft.com/office/drawing/2014/main" id="{DA1DA70E-DAB2-AFDA-C935-A5C3A0DFF8D4}"/>
+              </a:ext>
+            </a:extLst>
+          </p:cNvPr>
           <p:cNvSpPr>
             <a:spLocks noGrp="1"/>
           </p:cNvSpPr>
@@ -3620,7 +3637,13 @@
       </p:sp>
       <p:sp>
         <p:nvSpPr>
-          <p:cNvPr id="4" name="Slide Number Placeholder 3"/>
+          <p:cNvPr id="4" name="Slide Number Placeholder 3">
+            <a:extLst>
+              <a:ext uri="{FF2B5EF4-FFF2-40B4-BE49-F238E27FC236}">
+                <a16:creationId xmlns:a16="http://schemas.microsoft.com/office/drawing/2014/main" id="{482931FE-71A7-3C26-FD08-17E296121BB0}"/>
+              </a:ext>
+            </a:extLst>
+          </p:cNvPr>
           <p:cNvSpPr>
             <a:spLocks noGrp="1"/>
           </p:cNvSpPr>
@@ -3644,7 +3667,7 @@
     </p:spTree>
     <p:extLst>
       <p:ext uri="{BB962C8B-B14F-4D97-AF65-F5344CB8AC3E}">
-        <p14:creationId xmlns:p14="http://schemas.microsoft.com/office/powerpoint/2010/main" val="2247470920"/>
+        <p14:creationId xmlns:p14="http://schemas.microsoft.com/office/powerpoint/2010/main" val="4121485717"/>
       </p:ext>
     </p:extLst>
   </p:cSld>
@@ -3659,7 +3682,13 @@
   <p:cSld>
     <p:spTree>
       <p:nvGrpSpPr>
-        <p:cNvPr id="1" name=""/>
+        <p:cNvPr id="1" name="">
+          <a:extLst>
+            <a:ext uri="{FF2B5EF4-FFF2-40B4-BE49-F238E27FC236}">
+              <a16:creationId xmlns:a16="http://schemas.microsoft.com/office/drawing/2014/main" id="{D9544876-C4DF-550E-CC35-1805A243C25F}"/>
+            </a:ext>
+          </a:extLst>
+        </p:cNvPr>
         <p:cNvGrpSpPr/>
         <p:nvPr/>
       </p:nvGrpSpPr>
@@ -3673,7 +3702,13 @@
       </p:grpSpPr>
       <p:sp>
         <p:nvSpPr>
-          <p:cNvPr id="2" name="Slide Image Placeholder 1"/>
+          <p:cNvPr id="2" name="Slide Image Placeholder 1">
+            <a:extLst>
+              <a:ext uri="{FF2B5EF4-FFF2-40B4-BE49-F238E27FC236}">
+                <a16:creationId xmlns:a16="http://schemas.microsoft.com/office/drawing/2014/main" id="{4EE6C0C4-67CC-71A7-F48D-A479ED76E0B0}"/>
+              </a:ext>
+            </a:extLst>
+          </p:cNvPr>
           <p:cNvSpPr>
             <a:spLocks noGrp="1" noRot="1" noChangeAspect="1"/>
           </p:cNvSpPr>
@@ -3685,7 +3720,13 @@
       </p:sp>
       <p:sp>
         <p:nvSpPr>
-          <p:cNvPr id="3" name="Notes Placeholder 2"/>
+          <p:cNvPr id="3" name="Notes Placeholder 2">
+            <a:extLst>
+              <a:ext uri="{FF2B5EF4-FFF2-40B4-BE49-F238E27FC236}">
+                <a16:creationId xmlns:a16="http://schemas.microsoft.com/office/drawing/2014/main" id="{A4F42242-DBF9-F66B-75F5-D6893CBDD971}"/>
+              </a:ext>
+            </a:extLst>
+          </p:cNvPr>
           <p:cNvSpPr>
             <a:spLocks noGrp="1"/>
           </p:cNvSpPr>
@@ -3704,7 +3745,13 @@
       </p:sp>
       <p:sp>
         <p:nvSpPr>
-          <p:cNvPr id="4" name="Slide Number Placeholder 3"/>
+          <p:cNvPr id="4" name="Slide Number Placeholder 3">
+            <a:extLst>
+              <a:ext uri="{FF2B5EF4-FFF2-40B4-BE49-F238E27FC236}">
+                <a16:creationId xmlns:a16="http://schemas.microsoft.com/office/drawing/2014/main" id="{D3D909D5-DE5D-A2CC-ABA1-683D88CCE88F}"/>
+              </a:ext>
+            </a:extLst>
+          </p:cNvPr>
           <p:cNvSpPr>
             <a:spLocks noGrp="1"/>
           </p:cNvSpPr>
@@ -3728,91 +3775,7 @@
     </p:spTree>
     <p:extLst>
       <p:ext uri="{BB962C8B-B14F-4D97-AF65-F5344CB8AC3E}">
-        <p14:creationId xmlns:p14="http://schemas.microsoft.com/office/powerpoint/2010/main" val="828453912"/>
-      </p:ext>
-    </p:extLst>
-  </p:cSld>
-  <p:clrMapOvr>
-    <a:masterClrMapping/>
-  </p:clrMapOvr>
-</p:notes>
-</file>
-
-<file path=ppt/notesSlides/notesSlide13.xml><?xml version="1.0" encoding="utf-8"?>
-<p:notes xmlns:a="http://schemas.openxmlformats.org/drawingml/2006/main" xmlns:r="http://schemas.openxmlformats.org/officeDocument/2006/relationships" xmlns:p="http://schemas.openxmlformats.org/presentationml/2006/main">
-  <p:cSld>
-    <p:spTree>
-      <p:nvGrpSpPr>
-        <p:cNvPr id="1" name=""/>
-        <p:cNvGrpSpPr/>
-        <p:nvPr/>
-      </p:nvGrpSpPr>
-      <p:grpSpPr>
-        <a:xfrm>
-          <a:off x="0" y="0"/>
-          <a:ext cx="0" cy="0"/>
-          <a:chOff x="0" y="0"/>
-          <a:chExt cx="0" cy="0"/>
-        </a:xfrm>
-      </p:grpSpPr>
-      <p:sp>
-        <p:nvSpPr>
-          <p:cNvPr id="2" name="Slide Image Placeholder 1"/>
-          <p:cNvSpPr>
-            <a:spLocks noGrp="1" noRot="1" noChangeAspect="1"/>
-          </p:cNvSpPr>
-          <p:nvPr>
-            <p:ph type="sldImg"/>
-          </p:nvPr>
-        </p:nvSpPr>
-        <p:spPr/>
-      </p:sp>
-      <p:sp>
-        <p:nvSpPr>
-          <p:cNvPr id="3" name="Notes Placeholder 2"/>
-          <p:cNvSpPr>
-            <a:spLocks noGrp="1"/>
-          </p:cNvSpPr>
-          <p:nvPr>
-            <p:ph type="body" idx="1"/>
-          </p:nvPr>
-        </p:nvSpPr>
-        <p:spPr/>
-        <p:txBody>
-          <a:bodyPr/>
-          <a:lstStyle/>
-          <a:p>
-            <a:endParaRPr lang="en-US"/>
-          </a:p>
-        </p:txBody>
-      </p:sp>
-      <p:sp>
-        <p:nvSpPr>
-          <p:cNvPr id="4" name="Slide Number Placeholder 3"/>
-          <p:cNvSpPr>
-            <a:spLocks noGrp="1"/>
-          </p:cNvSpPr>
-          <p:nvPr>
-            <p:ph type="sldNum" sz="quarter" idx="5"/>
-          </p:nvPr>
-        </p:nvSpPr>
-        <p:spPr/>
-        <p:txBody>
-          <a:bodyPr/>
-          <a:lstStyle/>
-          <a:p>
-            <a:fld id="{D93BFE88-EEA7-4C59-A9BC-474AE7EC3DDC}" type="slidenum">
-              <a:rPr lang="en-US" smtClean="0"/>
-              <a:t>13</a:t>
-            </a:fld>
-            <a:endParaRPr lang="en-US"/>
-          </a:p>
-        </p:txBody>
-      </p:sp>
-    </p:spTree>
-    <p:extLst>
-      <p:ext uri="{BB962C8B-B14F-4D97-AF65-F5344CB8AC3E}">
-        <p14:creationId xmlns:p14="http://schemas.microsoft.com/office/powerpoint/2010/main" val="2861464519"/>
+        <p14:creationId xmlns:p14="http://schemas.microsoft.com/office/powerpoint/2010/main" val="3827770348"/>
       </p:ext>
     </p:extLst>
   </p:cSld>
@@ -4809,7 +4772,7 @@
           <a:p>
             <a:fld id="{CDC8EF59-AF86-4629-ADB7-9E319F209855}" type="datetimeFigureOut">
               <a:rPr lang="en-US" smtClean="0"/>
-              <a:t>6/1/2025</a:t>
+              <a:t>6/2/2025</a:t>
             </a:fld>
             <a:endParaRPr lang="en-US"/>
           </a:p>
@@ -5007,7 +4970,7 @@
           <a:p>
             <a:fld id="{CDC8EF59-AF86-4629-ADB7-9E319F209855}" type="datetimeFigureOut">
               <a:rPr lang="en-US" smtClean="0"/>
-              <a:t>6/1/2025</a:t>
+              <a:t>6/2/2025</a:t>
             </a:fld>
             <a:endParaRPr lang="en-US"/>
           </a:p>
@@ -5215,7 +5178,7 @@
           <a:p>
             <a:fld id="{CDC8EF59-AF86-4629-ADB7-9E319F209855}" type="datetimeFigureOut">
               <a:rPr lang="en-US" smtClean="0"/>
-              <a:t>6/1/2025</a:t>
+              <a:t>6/2/2025</a:t>
             </a:fld>
             <a:endParaRPr lang="en-US"/>
           </a:p>
@@ -5539,8 +5502,8 @@
         </p:blipFill>
         <p:spPr>
           <a:xfrm>
-            <a:off x="455627" y="9277"/>
-            <a:ext cx="954997" cy="482322"/>
+            <a:off x="455627" y="21776"/>
+            <a:ext cx="868347" cy="438559"/>
           </a:xfrm>
           <a:prstGeom prst="rect">
             <a:avLst/>
@@ -5685,7 +5648,7 @@
           <a:p>
             <a:fld id="{CDC8EF59-AF86-4629-ADB7-9E319F209855}" type="datetimeFigureOut">
               <a:rPr lang="en-US" smtClean="0"/>
-              <a:t>6/1/2025</a:t>
+              <a:t>6/2/2025</a:t>
             </a:fld>
             <a:endParaRPr lang="en-US"/>
           </a:p>
@@ -5960,7 +5923,7 @@
           <a:p>
             <a:fld id="{CDC8EF59-AF86-4629-ADB7-9E319F209855}" type="datetimeFigureOut">
               <a:rPr lang="en-US" smtClean="0"/>
-              <a:t>6/1/2025</a:t>
+              <a:t>6/2/2025</a:t>
             </a:fld>
             <a:endParaRPr lang="en-US"/>
           </a:p>
@@ -6225,7 +6188,7 @@
           <a:p>
             <a:fld id="{CDC8EF59-AF86-4629-ADB7-9E319F209855}" type="datetimeFigureOut">
               <a:rPr lang="en-US" smtClean="0"/>
-              <a:t>6/1/2025</a:t>
+              <a:t>6/2/2025</a:t>
             </a:fld>
             <a:endParaRPr lang="en-US"/>
           </a:p>
@@ -6637,7 +6600,7 @@
           <a:p>
             <a:fld id="{CDC8EF59-AF86-4629-ADB7-9E319F209855}" type="datetimeFigureOut">
               <a:rPr lang="en-US" smtClean="0"/>
-              <a:t>6/1/2025</a:t>
+              <a:t>6/2/2025</a:t>
             </a:fld>
             <a:endParaRPr lang="en-US"/>
           </a:p>
@@ -6778,7 +6741,7 @@
           <a:p>
             <a:fld id="{CDC8EF59-AF86-4629-ADB7-9E319F209855}" type="datetimeFigureOut">
               <a:rPr lang="en-US" smtClean="0"/>
-              <a:t>6/1/2025</a:t>
+              <a:t>6/2/2025</a:t>
             </a:fld>
             <a:endParaRPr lang="en-US"/>
           </a:p>
@@ -6891,7 +6854,7 @@
           <a:p>
             <a:fld id="{CDC8EF59-AF86-4629-ADB7-9E319F209855}" type="datetimeFigureOut">
               <a:rPr lang="en-US" smtClean="0"/>
-              <a:t>6/1/2025</a:t>
+              <a:t>6/2/2025</a:t>
             </a:fld>
             <a:endParaRPr lang="en-US"/>
           </a:p>
@@ -7202,7 +7165,7 @@
           <a:p>
             <a:fld id="{CDC8EF59-AF86-4629-ADB7-9E319F209855}" type="datetimeFigureOut">
               <a:rPr lang="en-US" smtClean="0"/>
-              <a:t>6/1/2025</a:t>
+              <a:t>6/2/2025</a:t>
             </a:fld>
             <a:endParaRPr lang="en-US"/>
           </a:p>
@@ -7490,7 +7453,7 @@
           <a:p>
             <a:fld id="{CDC8EF59-AF86-4629-ADB7-9E319F209855}" type="datetimeFigureOut">
               <a:rPr lang="en-US" smtClean="0"/>
-              <a:t>6/1/2025</a:t>
+              <a:t>6/2/2025</a:t>
             </a:fld>
             <a:endParaRPr lang="en-US"/>
           </a:p>
@@ -7731,7 +7694,7 @@
           <a:p>
             <a:fld id="{CDC8EF59-AF86-4629-ADB7-9E319F209855}" type="datetimeFigureOut">
               <a:rPr lang="en-US" smtClean="0"/>
-              <a:t>6/1/2025</a:t>
+              <a:t>6/2/2025</a:t>
             </a:fld>
             <a:endParaRPr lang="en-US"/>
           </a:p>
@@ -8201,7 +8164,7 @@
               <a:buNone/>
             </a:pPr>
             <a:r>
-              <a:rPr lang="en-US" dirty="0"/>
+              <a:rPr lang="en-US" b="1" dirty="0"/>
               <a:t>KAZEEM E. BELLO</a:t>
             </a:r>
           </a:p>
@@ -8209,10 +8172,10 @@
       </p:sp>
       <p:sp>
         <p:nvSpPr>
-          <p:cNvPr id="4" name="Title 1">
-            <a:extLst>
-              <a:ext uri="{FF2B5EF4-FFF2-40B4-BE49-F238E27FC236}">
-                <a16:creationId xmlns:a16="http://schemas.microsoft.com/office/drawing/2014/main" id="{FE74963B-0D04-5FB9-6B1D-DC4F7C3C11CF}"/>
+          <p:cNvPr id="5" name="Title 1">
+            <a:extLst>
+              <a:ext uri="{FF2B5EF4-FFF2-40B4-BE49-F238E27FC236}">
+                <a16:creationId xmlns:a16="http://schemas.microsoft.com/office/drawing/2014/main" id="{E4993F80-1C69-6AA1-A120-D87E177982E6}"/>
               </a:ext>
             </a:extLst>
           </p:cNvPr>
@@ -8223,165 +8186,7 @@
         </p:nvSpPr>
         <p:spPr>
           <a:xfrm>
-            <a:off x="3328988" y="286543"/>
-            <a:ext cx="6243637" cy="989013"/>
-          </a:xfrm>
-          <a:prstGeom prst="rect">
-            <a:avLst/>
-          </a:prstGeom>
-          <a:noFill/>
-          <a:ln w="19050" cap="flat" cmpd="sng" algn="ctr">
-            <a:noFill/>
-            <a:prstDash val="solid"/>
-            <a:miter lim="800000"/>
-          </a:ln>
-        </p:spPr>
-        <p:style>
-          <a:lnRef idx="2">
-            <a:schemeClr val="accent1"/>
-          </a:lnRef>
-          <a:fillRef idx="1">
-            <a:schemeClr val="lt1"/>
-          </a:fillRef>
-          <a:effectRef idx="0">
-            <a:schemeClr val="accent1"/>
-          </a:effectRef>
-          <a:fontRef idx="minor">
-            <a:schemeClr val="dk1"/>
-          </a:fontRef>
-        </p:style>
-        <p:txBody>
-          <a:bodyPr vert="horz" lIns="91440" tIns="45720" rIns="91440" bIns="45720" rtlCol="0" anchor="ctr">
-            <a:normAutofit/>
-          </a:bodyPr>
-          <a:lstStyle>
-            <a:lvl1pPr algn="l" defTabSz="914400" rtl="0" eaLnBrk="1" latinLnBrk="0" hangingPunct="1">
-              <a:lnSpc>
-                <a:spcPct val="90000"/>
-              </a:lnSpc>
-              <a:spcBef>
-                <a:spcPct val="0"/>
-              </a:spcBef>
-              <a:buNone/>
-              <a:defRPr sz="4400" kern="1200">
-                <a:solidFill>
-                  <a:schemeClr val="dk1"/>
-                </a:solidFill>
-                <a:latin typeface="+mn-lt"/>
-                <a:ea typeface="+mn-ea"/>
-                <a:cs typeface="+mn-cs"/>
-              </a:defRPr>
-            </a:lvl1pPr>
-            <a:lvl2pPr>
-              <a:defRPr>
-                <a:solidFill>
-                  <a:schemeClr val="dk1"/>
-                </a:solidFill>
-                <a:latin typeface="+mn-lt"/>
-                <a:ea typeface="+mn-ea"/>
-                <a:cs typeface="+mn-cs"/>
-              </a:defRPr>
-            </a:lvl2pPr>
-            <a:lvl3pPr>
-              <a:defRPr>
-                <a:solidFill>
-                  <a:schemeClr val="dk1"/>
-                </a:solidFill>
-                <a:latin typeface="+mn-lt"/>
-                <a:ea typeface="+mn-ea"/>
-                <a:cs typeface="+mn-cs"/>
-              </a:defRPr>
-            </a:lvl3pPr>
-            <a:lvl4pPr>
-              <a:defRPr>
-                <a:solidFill>
-                  <a:schemeClr val="dk1"/>
-                </a:solidFill>
-                <a:latin typeface="+mn-lt"/>
-                <a:ea typeface="+mn-ea"/>
-                <a:cs typeface="+mn-cs"/>
-              </a:defRPr>
-            </a:lvl4pPr>
-            <a:lvl5pPr>
-              <a:defRPr>
-                <a:solidFill>
-                  <a:schemeClr val="dk1"/>
-                </a:solidFill>
-                <a:latin typeface="+mn-lt"/>
-                <a:ea typeface="+mn-ea"/>
-                <a:cs typeface="+mn-cs"/>
-              </a:defRPr>
-            </a:lvl5pPr>
-            <a:lvl6pPr>
-              <a:defRPr>
-                <a:solidFill>
-                  <a:schemeClr val="dk1"/>
-                </a:solidFill>
-                <a:latin typeface="+mn-lt"/>
-                <a:ea typeface="+mn-ea"/>
-                <a:cs typeface="+mn-cs"/>
-              </a:defRPr>
-            </a:lvl6pPr>
-            <a:lvl7pPr>
-              <a:defRPr>
-                <a:solidFill>
-                  <a:schemeClr val="dk1"/>
-                </a:solidFill>
-                <a:latin typeface="+mn-lt"/>
-                <a:ea typeface="+mn-ea"/>
-                <a:cs typeface="+mn-cs"/>
-              </a:defRPr>
-            </a:lvl7pPr>
-            <a:lvl8pPr>
-              <a:defRPr>
-                <a:solidFill>
-                  <a:schemeClr val="dk1"/>
-                </a:solidFill>
-                <a:latin typeface="+mn-lt"/>
-                <a:ea typeface="+mn-ea"/>
-                <a:cs typeface="+mn-cs"/>
-              </a:defRPr>
-            </a:lvl8pPr>
-            <a:lvl9pPr>
-              <a:defRPr>
-                <a:solidFill>
-                  <a:schemeClr val="dk1"/>
-                </a:solidFill>
-                <a:latin typeface="+mn-lt"/>
-                <a:ea typeface="+mn-ea"/>
-                <a:cs typeface="+mn-cs"/>
-              </a:defRPr>
-            </a:lvl9pPr>
-          </a:lstStyle>
-          <a:p>
-            <a:r>
-              <a:rPr lang="en-US" sz="3200" dirty="0">
-                <a:solidFill>
-                  <a:schemeClr val="tx1"/>
-                </a:solidFill>
-              </a:rPr>
-              <a:t>Combine Facility Management</a:t>
-            </a:r>
-          </a:p>
-        </p:txBody>
-      </p:sp>
-      <p:sp>
-        <p:nvSpPr>
-          <p:cNvPr id="5" name="Title 1">
-            <a:extLst>
-              <a:ext uri="{FF2B5EF4-FFF2-40B4-BE49-F238E27FC236}">
-                <a16:creationId xmlns:a16="http://schemas.microsoft.com/office/drawing/2014/main" id="{E4993F80-1C69-6AA1-A120-D87E177982E6}"/>
-              </a:ext>
-            </a:extLst>
-          </p:cNvPr>
-          <p:cNvSpPr txBox="1">
-            <a:spLocks/>
-          </p:cNvSpPr>
-          <p:nvPr/>
-        </p:nvSpPr>
-        <p:spPr>
-          <a:xfrm>
-            <a:off x="1438274" y="1639490"/>
+            <a:off x="1447799" y="1985565"/>
             <a:ext cx="9725025" cy="733425"/>
           </a:xfrm>
           <a:prstGeom prst="rect">
@@ -8547,7 +8352,7 @@
         <p:cNvPr id="1" name="">
           <a:extLst>
             <a:ext uri="{FF2B5EF4-FFF2-40B4-BE49-F238E27FC236}">
-              <a16:creationId xmlns:a16="http://schemas.microsoft.com/office/drawing/2014/main" id="{CA30C162-C958-B723-B154-C1C4A77A2929}"/>
+              <a16:creationId xmlns:a16="http://schemas.microsoft.com/office/drawing/2014/main" id="{520EE549-F756-2448-191B-BCFF12B73368}"/>
             </a:ext>
           </a:extLst>
         </p:cNvPr>
@@ -8564,10 +8369,10 @@
       </p:grpSpPr>
       <p:sp>
         <p:nvSpPr>
-          <p:cNvPr id="3" name="TextBox 2">
-            <a:extLst>
-              <a:ext uri="{FF2B5EF4-FFF2-40B4-BE49-F238E27FC236}">
-                <a16:creationId xmlns:a16="http://schemas.microsoft.com/office/drawing/2014/main" id="{906714F1-C628-B4F9-F3CB-EC924A78B71E}"/>
+          <p:cNvPr id="4" name="TextBox 3">
+            <a:extLst>
+              <a:ext uri="{FF2B5EF4-FFF2-40B4-BE49-F238E27FC236}">
+                <a16:creationId xmlns:a16="http://schemas.microsoft.com/office/drawing/2014/main" id="{D633AFD9-4206-5D64-43AF-F96C79672EA9}"/>
               </a:ext>
             </a:extLst>
           </p:cNvPr>
@@ -8576,91 +8381,7 @@
         </p:nvSpPr>
         <p:spPr>
           <a:xfrm>
-            <a:off x="928368" y="5935933"/>
-            <a:ext cx="2256158" cy="338554"/>
-          </a:xfrm>
-          <a:prstGeom prst="rect">
-            <a:avLst/>
-          </a:prstGeom>
-          <a:noFill/>
-        </p:spPr>
-        <p:txBody>
-          <a:bodyPr wrap="square" rtlCol="0">
-            <a:spAutoFit/>
-          </a:bodyPr>
-          <a:lstStyle/>
-          <a:p>
-            <a:pPr defTabSz="329184">
-              <a:spcAft>
-                <a:spcPts val="600"/>
-              </a:spcAft>
-            </a:pPr>
-            <a:r>
-              <a:rPr lang="en-US" sz="1600" b="1" kern="1200" dirty="0">
-                <a:latin typeface="+mn-lt"/>
-                <a:ea typeface="+mn-ea"/>
-                <a:cs typeface="+mn-cs"/>
-              </a:rPr>
-              <a:t>TP, age, FU, FS</a:t>
-            </a:r>
-            <a:endParaRPr lang="en-US" sz="1600" b="1" dirty="0"/>
-          </a:p>
-        </p:txBody>
-      </p:sp>
-      <p:pic>
-        <p:nvPicPr>
-          <p:cNvPr id="12" name="Graphic 11" descr="Arrow: Straight with solid fill">
-            <a:extLst>
-              <a:ext uri="{FF2B5EF4-FFF2-40B4-BE49-F238E27FC236}">
-                <a16:creationId xmlns:a16="http://schemas.microsoft.com/office/drawing/2014/main" id="{9E3C9E44-668B-3896-F79B-BEDCB4A56538}"/>
-              </a:ext>
-            </a:extLst>
-          </p:cNvPr>
-          <p:cNvPicPr>
-            <a:picLocks noChangeAspect="1"/>
-          </p:cNvPicPr>
-          <p:nvPr/>
-        </p:nvPicPr>
-        <p:blipFill>
-          <a:blip r:embed="rId3">
-            <a:extLst>
-              <a:ext uri="{28A0092B-C50C-407E-A947-70E740481C1C}">
-                <a14:useLocalDpi xmlns:a14="http://schemas.microsoft.com/office/drawing/2010/main" val="0"/>
-              </a:ext>
-              <a:ext uri="{96DAC541-7B7A-43D3-8B79-37D633B846F1}">
-                <asvg:svgBlip xmlns:asvg="http://schemas.microsoft.com/office/drawing/2016/SVG/main" r:embed="rId4"/>
-              </a:ext>
-            </a:extLst>
-          </a:blip>
-          <a:stretch>
-            <a:fillRect/>
-          </a:stretch>
-        </p:blipFill>
-        <p:spPr>
-          <a:xfrm rot="10800000">
-            <a:off x="441961" y="5862007"/>
-            <a:ext cx="486407" cy="486407"/>
-          </a:xfrm>
-          <a:prstGeom prst="rect">
-            <a:avLst/>
-          </a:prstGeom>
-        </p:spPr>
-      </p:pic>
-      <p:sp>
-        <p:nvSpPr>
-          <p:cNvPr id="4" name="TextBox 3">
-            <a:extLst>
-              <a:ext uri="{FF2B5EF4-FFF2-40B4-BE49-F238E27FC236}">
-                <a16:creationId xmlns:a16="http://schemas.microsoft.com/office/drawing/2014/main" id="{78A33B37-3C79-EEFD-459C-051A303E74DE}"/>
-              </a:ext>
-            </a:extLst>
-          </p:cNvPr>
-          <p:cNvSpPr txBox="1"/>
-          <p:nvPr/>
-        </p:nvSpPr>
-        <p:spPr>
-          <a:xfrm>
-            <a:off x="4112805" y="415626"/>
+            <a:off x="3880440" y="415626"/>
             <a:ext cx="4431120" cy="584775"/>
           </a:xfrm>
           <a:prstGeom prst="rect">
@@ -8676,17 +8397,107 @@
           <a:p>
             <a:r>
               <a:rPr lang="en-US" sz="3200" b="1" dirty="0"/>
-              <a:t>Feature Importance</a:t>
+              <a:t>Model Comparison</a:t>
             </a:r>
+          </a:p>
+        </p:txBody>
+      </p:sp>
+      <p:sp>
+        <p:nvSpPr>
+          <p:cNvPr id="26" name="TextBox 25">
+            <a:extLst>
+              <a:ext uri="{FF2B5EF4-FFF2-40B4-BE49-F238E27FC236}">
+                <a16:creationId xmlns:a16="http://schemas.microsoft.com/office/drawing/2014/main" id="{DD27E93E-3C0F-163B-5564-EC44CA53B966}"/>
+              </a:ext>
+            </a:extLst>
+          </p:cNvPr>
+          <p:cNvSpPr txBox="1"/>
+          <p:nvPr/>
+        </p:nvSpPr>
+        <p:spPr>
+          <a:xfrm>
+            <a:off x="329710" y="1145666"/>
+            <a:ext cx="2349499" cy="523220"/>
+          </a:xfrm>
+          <a:prstGeom prst="rect">
+            <a:avLst/>
+          </a:prstGeom>
+          <a:noFill/>
+        </p:spPr>
+        <p:txBody>
+          <a:bodyPr wrap="square" rtlCol="0">
+            <a:spAutoFit/>
+          </a:bodyPr>
+          <a:lstStyle/>
+          <a:p>
+            <a:pPr algn="ctr" defTabSz="329184">
+              <a:spcAft>
+                <a:spcPts val="600"/>
+              </a:spcAft>
+            </a:pPr>
+            <a:r>
+              <a:rPr lang="en-US" sz="1400" b="1" kern="1200" dirty="0">
+                <a:latin typeface="+mn-lt"/>
+                <a:ea typeface="+mn-ea"/>
+                <a:cs typeface="+mn-cs"/>
+              </a:rPr>
+              <a:t>Evaluation metrics of the Tuned models</a:t>
+            </a:r>
+            <a:endParaRPr lang="en-US" sz="1400" b="1" dirty="0"/>
+          </a:p>
+        </p:txBody>
+      </p:sp>
+      <p:sp>
+        <p:nvSpPr>
+          <p:cNvPr id="28" name="TextBox 27">
+            <a:extLst>
+              <a:ext uri="{FF2B5EF4-FFF2-40B4-BE49-F238E27FC236}">
+                <a16:creationId xmlns:a16="http://schemas.microsoft.com/office/drawing/2014/main" id="{B5844465-5C0E-3909-BEC8-2C46030E6BC5}"/>
+              </a:ext>
+            </a:extLst>
+          </p:cNvPr>
+          <p:cNvSpPr txBox="1"/>
+          <p:nvPr/>
+        </p:nvSpPr>
+        <p:spPr>
+          <a:xfrm>
+            <a:off x="375922" y="3643131"/>
+            <a:ext cx="2541907" cy="738664"/>
+          </a:xfrm>
+          <a:prstGeom prst="rect">
+            <a:avLst/>
+          </a:prstGeom>
+          <a:noFill/>
+        </p:spPr>
+        <p:txBody>
+          <a:bodyPr wrap="square" rtlCol="0">
+            <a:spAutoFit/>
+          </a:bodyPr>
+          <a:lstStyle/>
+          <a:p>
+            <a:pPr algn="just" defTabSz="329184">
+              <a:spcAft>
+                <a:spcPts val="600"/>
+              </a:spcAft>
+            </a:pPr>
+            <a:r>
+              <a:rPr lang="en-US" sz="1400" b="1" kern="1200" dirty="0">
+                <a:latin typeface="+mn-lt"/>
+                <a:ea typeface="+mn-ea"/>
+                <a:cs typeface="+mn-cs"/>
+              </a:rPr>
+              <a:t>Evaluation metrics of the Tuned models After Feature Selection</a:t>
+            </a:r>
+            <a:endParaRPr lang="en-US" sz="1400" b="1" dirty="0"/>
           </a:p>
         </p:txBody>
       </p:sp>
       <p:pic>
         <p:nvPicPr>
-          <p:cNvPr id="10" name="Picture 9">
-            <a:extLst>
-              <a:ext uri="{FF2B5EF4-FFF2-40B4-BE49-F238E27FC236}">
-                <a16:creationId xmlns:a16="http://schemas.microsoft.com/office/drawing/2014/main" id="{46AD7384-E3D7-89CF-C550-B5E08FD918D0}"/>
+          <p:cNvPr id="35" name="Picture 34">
+            <a:extLst>
+              <a:ext uri="{FF2B5EF4-FFF2-40B4-BE49-F238E27FC236}">
+                <a16:creationId xmlns:a16="http://schemas.microsoft.com/office/drawing/2014/main" id="{235CED21-A834-7931-E13C-C860BED9709C}"/>
               </a:ext>
             </a:extLst>
           </p:cNvPr>
@@ -8696,27 +8507,596 @@
           <p:nvPr/>
         </p:nvPicPr>
         <p:blipFill>
-          <a:blip r:embed="rId5"/>
+          <a:blip r:embed="rId3"/>
           <a:stretch>
             <a:fillRect/>
           </a:stretch>
         </p:blipFill>
         <p:spPr>
           <a:xfrm>
-            <a:off x="251461" y="1048835"/>
-            <a:ext cx="6126486" cy="4742330"/>
+            <a:off x="7763365" y="1360541"/>
+            <a:ext cx="4098925" cy="4593721"/>
           </a:xfrm>
           <a:prstGeom prst="rect">
             <a:avLst/>
           </a:prstGeom>
         </p:spPr>
       </p:pic>
+      <p:sp>
+        <p:nvSpPr>
+          <p:cNvPr id="36" name="TextBox 35">
+            <a:extLst>
+              <a:ext uri="{FF2B5EF4-FFF2-40B4-BE49-F238E27FC236}">
+                <a16:creationId xmlns:a16="http://schemas.microsoft.com/office/drawing/2014/main" id="{3BD2AEC6-DC54-A6BF-A2B0-03B9E7F6BC31}"/>
+              </a:ext>
+            </a:extLst>
+          </p:cNvPr>
+          <p:cNvSpPr txBox="1"/>
+          <p:nvPr/>
+        </p:nvSpPr>
+        <p:spPr>
+          <a:xfrm>
+            <a:off x="8474070" y="1226372"/>
+            <a:ext cx="2349499" cy="584775"/>
+          </a:xfrm>
+          <a:prstGeom prst="rect">
+            <a:avLst/>
+          </a:prstGeom>
+          <a:noFill/>
+        </p:spPr>
+        <p:txBody>
+          <a:bodyPr wrap="square" rtlCol="0">
+            <a:spAutoFit/>
+          </a:bodyPr>
+          <a:lstStyle/>
+          <a:p>
+            <a:pPr algn="ctr" defTabSz="329184">
+              <a:spcAft>
+                <a:spcPts val="600"/>
+              </a:spcAft>
+            </a:pPr>
+            <a:r>
+              <a:rPr lang="en-US" sz="1600" b="1" kern="1200" dirty="0">
+                <a:latin typeface="+mn-lt"/>
+                <a:ea typeface="+mn-ea"/>
+                <a:cs typeface="+mn-cs"/>
+              </a:rPr>
+              <a:t>Confusion Matrix of the Best Model (XGB)</a:t>
+            </a:r>
+            <a:endParaRPr lang="en-US" sz="1600" b="1" dirty="0"/>
+          </a:p>
+        </p:txBody>
+      </p:sp>
+      <p:graphicFrame>
+        <p:nvGraphicFramePr>
+          <p:cNvPr id="2" name="Table 1">
+            <a:extLst>
+              <a:ext uri="{FF2B5EF4-FFF2-40B4-BE49-F238E27FC236}">
+                <a16:creationId xmlns:a16="http://schemas.microsoft.com/office/drawing/2014/main" id="{3AF24873-1935-C2E7-DFC5-47EF43DB573F}"/>
+              </a:ext>
+            </a:extLst>
+          </p:cNvPr>
+          <p:cNvGraphicFramePr>
+            <a:graphicFrameLocks noGrp="1"/>
+          </p:cNvGraphicFramePr>
+          <p:nvPr>
+            <p:extLst>
+              <p:ext uri="{D42A27DB-BD31-4B8C-83A1-F6EECF244321}">
+                <p14:modId xmlns:p14="http://schemas.microsoft.com/office/powerpoint/2010/main" val="1991033523"/>
+              </p:ext>
+            </p:extLst>
+          </p:nvPr>
+        </p:nvGraphicFramePr>
+        <p:xfrm>
+          <a:off x="490614" y="1668886"/>
+          <a:ext cx="1928736" cy="1845840"/>
+        </p:xfrm>
+        <a:graphic>
+          <a:graphicData uri="http://schemas.openxmlformats.org/drawingml/2006/table">
+            <a:tbl>
+              <a:tblPr>
+                <a:tableStyleId>{5C22544A-7EE6-4342-B048-85BDC9FD1C3A}</a:tableStyleId>
+              </a:tblPr>
+              <a:tblGrid>
+                <a:gridCol w="1087480">
+                  <a:extLst>
+                    <a:ext uri="{9D8B030D-6E8A-4147-A177-3AD203B41FA5}">
+                      <a16:colId xmlns:a16="http://schemas.microsoft.com/office/drawing/2014/main" val="3123014283"/>
+                    </a:ext>
+                  </a:extLst>
+                </a:gridCol>
+                <a:gridCol w="841256">
+                  <a:extLst>
+                    <a:ext uri="{9D8B030D-6E8A-4147-A177-3AD203B41FA5}">
+                      <a16:colId xmlns:a16="http://schemas.microsoft.com/office/drawing/2014/main" val="4267143154"/>
+                    </a:ext>
+                  </a:extLst>
+                </a:gridCol>
+              </a:tblGrid>
+              <a:tr h="643602">
+                <a:tc>
+                  <a:txBody>
+                    <a:bodyPr/>
+                    <a:lstStyle/>
+                    <a:p>
+                      <a:pPr algn="ctr" fontAlgn="ctr"/>
+                      <a:r>
+                        <a:rPr lang="en-US" sz="1100" b="1" u="none" strike="noStrike" dirty="0">
+                          <a:effectLst/>
+                        </a:rPr>
+                        <a:t>Model Name</a:t>
+                      </a:r>
+                      <a:endParaRPr lang="en-US" sz="1100" b="1" i="0" u="none" strike="noStrike" dirty="0">
+                        <a:solidFill>
+                          <a:srgbClr val="000000"/>
+                        </a:solidFill>
+                        <a:effectLst/>
+                        <a:latin typeface="Segoe UI" panose="020B0502040204020203" pitchFamily="34" charset="0"/>
+                      </a:endParaRPr>
+                    </a:p>
+                  </a:txBody>
+                  <a:tcPr marL="9525" marR="9525" marT="9525" marB="0" anchor="ctr"/>
+                </a:tc>
+                <a:tc>
+                  <a:txBody>
+                    <a:bodyPr/>
+                    <a:lstStyle/>
+                    <a:p>
+                      <a:pPr algn="ctr" fontAlgn="ctr"/>
+                      <a:r>
+                        <a:rPr lang="en-US" sz="1100" b="1" u="none" strike="noStrike" dirty="0">
+                          <a:effectLst/>
+                        </a:rPr>
+                        <a:t>Accuracy (%)</a:t>
+                      </a:r>
+                      <a:endParaRPr lang="en-US" sz="1100" b="1" i="0" u="none" strike="noStrike" dirty="0">
+                        <a:solidFill>
+                          <a:srgbClr val="000000"/>
+                        </a:solidFill>
+                        <a:effectLst/>
+                        <a:latin typeface="Segoe UI" panose="020B0502040204020203" pitchFamily="34" charset="0"/>
+                      </a:endParaRPr>
+                    </a:p>
+                  </a:txBody>
+                  <a:tcPr marL="9525" marR="9525" marT="9525" marB="0" anchor="ctr"/>
+                </a:tc>
+                <a:extLst>
+                  <a:ext uri="{0D108BD9-81ED-4DB2-BD59-A6C34878D82A}">
+                    <a16:rowId xmlns:a16="http://schemas.microsoft.com/office/drawing/2014/main" val="3690172817"/>
+                  </a:ext>
+                </a:extLst>
+              </a:tr>
+              <a:tr h="400746">
+                <a:tc>
+                  <a:txBody>
+                    <a:bodyPr/>
+                    <a:lstStyle/>
+                    <a:p>
+                      <a:pPr algn="ctr" fontAlgn="ctr"/>
+                      <a:r>
+                        <a:rPr lang="en-US" sz="1100" u="none" strike="noStrike" dirty="0">
+                          <a:effectLst/>
+                        </a:rPr>
+                        <a:t>XGBoost</a:t>
+                      </a:r>
+                      <a:endParaRPr lang="en-US" sz="1100" b="0" i="0" u="none" strike="noStrike" dirty="0">
+                        <a:solidFill>
+                          <a:srgbClr val="000000"/>
+                        </a:solidFill>
+                        <a:effectLst/>
+                        <a:latin typeface="Segoe UI" panose="020B0502040204020203" pitchFamily="34" charset="0"/>
+                      </a:endParaRPr>
+                    </a:p>
+                  </a:txBody>
+                  <a:tcPr marL="9525" marR="9525" marT="38100" marB="38100" anchor="ctr"/>
+                </a:tc>
+                <a:tc>
+                  <a:txBody>
+                    <a:bodyPr/>
+                    <a:lstStyle/>
+                    <a:p>
+                      <a:pPr algn="ctr" fontAlgn="ctr"/>
+                      <a:r>
+                        <a:rPr lang="en-US" sz="1100" u="none" strike="noStrike" dirty="0">
+                          <a:effectLst/>
+                        </a:rPr>
+                        <a:t>97.9</a:t>
+                      </a:r>
+                      <a:endParaRPr lang="en-US" sz="1100" b="0" i="0" u="none" strike="noStrike" dirty="0">
+                        <a:solidFill>
+                          <a:srgbClr val="000000"/>
+                        </a:solidFill>
+                        <a:effectLst/>
+                        <a:latin typeface="Segoe UI" panose="020B0502040204020203" pitchFamily="34" charset="0"/>
+                      </a:endParaRPr>
+                    </a:p>
+                  </a:txBody>
+                  <a:tcPr marL="9525" marR="9525" marT="38100" marB="38100" anchor="ctr"/>
+                </a:tc>
+                <a:extLst>
+                  <a:ext uri="{0D108BD9-81ED-4DB2-BD59-A6C34878D82A}">
+                    <a16:rowId xmlns:a16="http://schemas.microsoft.com/office/drawing/2014/main" val="2041182056"/>
+                  </a:ext>
+                </a:extLst>
+              </a:tr>
+              <a:tr h="400746">
+                <a:tc>
+                  <a:txBody>
+                    <a:bodyPr/>
+                    <a:lstStyle/>
+                    <a:p>
+                      <a:pPr algn="ctr" fontAlgn="ctr"/>
+                      <a:r>
+                        <a:rPr lang="en-US" sz="1100" u="none" strike="noStrike" dirty="0">
+                          <a:effectLst/>
+                        </a:rPr>
+                        <a:t>CatBoost</a:t>
+                      </a:r>
+                      <a:endParaRPr lang="en-US" sz="1100" b="0" i="0" u="none" strike="noStrike" dirty="0">
+                        <a:solidFill>
+                          <a:srgbClr val="000000"/>
+                        </a:solidFill>
+                        <a:effectLst/>
+                        <a:latin typeface="Segoe UI" panose="020B0502040204020203" pitchFamily="34" charset="0"/>
+                      </a:endParaRPr>
+                    </a:p>
+                  </a:txBody>
+                  <a:tcPr marL="9525" marR="9525" marT="38100" marB="38100" anchor="ctr"/>
+                </a:tc>
+                <a:tc>
+                  <a:txBody>
+                    <a:bodyPr/>
+                    <a:lstStyle/>
+                    <a:p>
+                      <a:pPr algn="ctr" fontAlgn="ctr"/>
+                      <a:r>
+                        <a:rPr lang="en-US" sz="1100" u="none" strike="noStrike" dirty="0">
+                          <a:effectLst/>
+                        </a:rPr>
+                        <a:t>97.7</a:t>
+                      </a:r>
+                      <a:endParaRPr lang="en-US" sz="1100" b="0" i="0" u="none" strike="noStrike" dirty="0">
+                        <a:solidFill>
+                          <a:srgbClr val="000000"/>
+                        </a:solidFill>
+                        <a:effectLst/>
+                        <a:latin typeface="Segoe UI" panose="020B0502040204020203" pitchFamily="34" charset="0"/>
+                      </a:endParaRPr>
+                    </a:p>
+                  </a:txBody>
+                  <a:tcPr marL="9525" marR="9525" marT="38100" marB="38100" anchor="ctr"/>
+                </a:tc>
+                <a:extLst>
+                  <a:ext uri="{0D108BD9-81ED-4DB2-BD59-A6C34878D82A}">
+                    <a16:rowId xmlns:a16="http://schemas.microsoft.com/office/drawing/2014/main" val="3837326114"/>
+                  </a:ext>
+                </a:extLst>
+              </a:tr>
+              <a:tr h="400746">
+                <a:tc>
+                  <a:txBody>
+                    <a:bodyPr/>
+                    <a:lstStyle/>
+                    <a:p>
+                      <a:pPr algn="ctr" fontAlgn="ctr"/>
+                      <a:r>
+                        <a:rPr lang="en-US" sz="1100" u="none" strike="noStrike" dirty="0">
+                          <a:effectLst/>
+                        </a:rPr>
+                        <a:t>RandomForest</a:t>
+                      </a:r>
+                      <a:endParaRPr lang="en-US" sz="1100" b="0" i="0" u="none" strike="noStrike" dirty="0">
+                        <a:solidFill>
+                          <a:srgbClr val="000000"/>
+                        </a:solidFill>
+                        <a:effectLst/>
+                        <a:latin typeface="Segoe UI" panose="020B0502040204020203" pitchFamily="34" charset="0"/>
+                      </a:endParaRPr>
+                    </a:p>
+                  </a:txBody>
+                  <a:tcPr marL="9525" marR="9525" marT="38100" marB="38100" anchor="ctr"/>
+                </a:tc>
+                <a:tc>
+                  <a:txBody>
+                    <a:bodyPr/>
+                    <a:lstStyle/>
+                    <a:p>
+                      <a:pPr algn="ctr" fontAlgn="ctr"/>
+                      <a:r>
+                        <a:rPr lang="en-US" sz="1100" u="none" strike="noStrike" dirty="0">
+                          <a:effectLst/>
+                        </a:rPr>
+                        <a:t>97.6</a:t>
+                      </a:r>
+                      <a:endParaRPr lang="en-US" sz="1100" b="0" i="0" u="none" strike="noStrike" dirty="0">
+                        <a:solidFill>
+                          <a:srgbClr val="000000"/>
+                        </a:solidFill>
+                        <a:effectLst/>
+                        <a:latin typeface="Segoe UI" panose="020B0502040204020203" pitchFamily="34" charset="0"/>
+                      </a:endParaRPr>
+                    </a:p>
+                  </a:txBody>
+                  <a:tcPr marL="9525" marR="9525" marT="38100" marB="38100" anchor="ctr"/>
+                </a:tc>
+                <a:extLst>
+                  <a:ext uri="{0D108BD9-81ED-4DB2-BD59-A6C34878D82A}">
+                    <a16:rowId xmlns:a16="http://schemas.microsoft.com/office/drawing/2014/main" val="1762254307"/>
+                  </a:ext>
+                </a:extLst>
+              </a:tr>
+            </a:tbl>
+          </a:graphicData>
+        </a:graphic>
+      </p:graphicFrame>
+      <p:graphicFrame>
+        <p:nvGraphicFramePr>
+          <p:cNvPr id="10" name="Table 9">
+            <a:extLst>
+              <a:ext uri="{FF2B5EF4-FFF2-40B4-BE49-F238E27FC236}">
+                <a16:creationId xmlns:a16="http://schemas.microsoft.com/office/drawing/2014/main" id="{86589DA2-118D-8469-97F0-E833FD37632D}"/>
+              </a:ext>
+            </a:extLst>
+          </p:cNvPr>
+          <p:cNvGraphicFramePr>
+            <a:graphicFrameLocks noGrp="1"/>
+          </p:cNvGraphicFramePr>
+          <p:nvPr>
+            <p:extLst>
+              <p:ext uri="{D42A27DB-BD31-4B8C-83A1-F6EECF244321}">
+                <p14:modId xmlns:p14="http://schemas.microsoft.com/office/powerpoint/2010/main" val="721587742"/>
+              </p:ext>
+            </p:extLst>
+          </p:nvPr>
+        </p:nvGraphicFramePr>
+        <p:xfrm>
+          <a:off x="540091" y="4348310"/>
+          <a:ext cx="1928736" cy="1845840"/>
+        </p:xfrm>
+        <a:graphic>
+          <a:graphicData uri="http://schemas.openxmlformats.org/drawingml/2006/table">
+            <a:tbl>
+              <a:tblPr>
+                <a:tableStyleId>{5C22544A-7EE6-4342-B048-85BDC9FD1C3A}</a:tableStyleId>
+              </a:tblPr>
+              <a:tblGrid>
+                <a:gridCol w="1087480">
+                  <a:extLst>
+                    <a:ext uri="{9D8B030D-6E8A-4147-A177-3AD203B41FA5}">
+                      <a16:colId xmlns:a16="http://schemas.microsoft.com/office/drawing/2014/main" val="3123014283"/>
+                    </a:ext>
+                  </a:extLst>
+                </a:gridCol>
+                <a:gridCol w="841256">
+                  <a:extLst>
+                    <a:ext uri="{9D8B030D-6E8A-4147-A177-3AD203B41FA5}">
+                      <a16:colId xmlns:a16="http://schemas.microsoft.com/office/drawing/2014/main" val="4267143154"/>
+                    </a:ext>
+                  </a:extLst>
+                </a:gridCol>
+              </a:tblGrid>
+              <a:tr h="643602">
+                <a:tc>
+                  <a:txBody>
+                    <a:bodyPr/>
+                    <a:lstStyle/>
+                    <a:p>
+                      <a:pPr algn="ctr" fontAlgn="ctr"/>
+                      <a:r>
+                        <a:rPr lang="en-US" sz="1100" b="1" u="none" strike="noStrike" dirty="0">
+                          <a:effectLst/>
+                        </a:rPr>
+                        <a:t>Model Name</a:t>
+                      </a:r>
+                      <a:endParaRPr lang="en-US" sz="1100" b="1" i="0" u="none" strike="noStrike" dirty="0">
+                        <a:solidFill>
+                          <a:srgbClr val="000000"/>
+                        </a:solidFill>
+                        <a:effectLst/>
+                        <a:latin typeface="Segoe UI" panose="020B0502040204020203" pitchFamily="34" charset="0"/>
+                      </a:endParaRPr>
+                    </a:p>
+                  </a:txBody>
+                  <a:tcPr marL="9525" marR="9525" marT="9525" marB="0" anchor="ctr"/>
+                </a:tc>
+                <a:tc>
+                  <a:txBody>
+                    <a:bodyPr/>
+                    <a:lstStyle/>
+                    <a:p>
+                      <a:pPr algn="ctr" fontAlgn="ctr"/>
+                      <a:r>
+                        <a:rPr lang="en-US" sz="1100" b="1" u="none" strike="noStrike" dirty="0">
+                          <a:effectLst/>
+                        </a:rPr>
+                        <a:t>Accuracy (%)</a:t>
+                      </a:r>
+                      <a:endParaRPr lang="en-US" sz="1100" b="1" i="0" u="none" strike="noStrike" dirty="0">
+                        <a:solidFill>
+                          <a:srgbClr val="000000"/>
+                        </a:solidFill>
+                        <a:effectLst/>
+                        <a:latin typeface="Segoe UI" panose="020B0502040204020203" pitchFamily="34" charset="0"/>
+                      </a:endParaRPr>
+                    </a:p>
+                  </a:txBody>
+                  <a:tcPr marL="9525" marR="9525" marT="9525" marB="0" anchor="ctr"/>
+                </a:tc>
+                <a:extLst>
+                  <a:ext uri="{0D108BD9-81ED-4DB2-BD59-A6C34878D82A}">
+                    <a16:rowId xmlns:a16="http://schemas.microsoft.com/office/drawing/2014/main" val="3690172817"/>
+                  </a:ext>
+                </a:extLst>
+              </a:tr>
+              <a:tr h="400746">
+                <a:tc>
+                  <a:txBody>
+                    <a:bodyPr/>
+                    <a:lstStyle/>
+                    <a:p>
+                      <a:pPr algn="ctr" fontAlgn="ctr"/>
+                      <a:r>
+                        <a:rPr lang="en-US" sz="1100" u="none" strike="noStrike" dirty="0">
+                          <a:effectLst/>
+                        </a:rPr>
+                        <a:t>XGBoost</a:t>
+                      </a:r>
+                      <a:endParaRPr lang="en-US" sz="1100" b="0" i="0" u="none" strike="noStrike" dirty="0">
+                        <a:solidFill>
+                          <a:srgbClr val="000000"/>
+                        </a:solidFill>
+                        <a:effectLst/>
+                        <a:latin typeface="Segoe UI" panose="020B0502040204020203" pitchFamily="34" charset="0"/>
+                      </a:endParaRPr>
+                    </a:p>
+                  </a:txBody>
+                  <a:tcPr marL="9525" marR="9525" marT="38100" marB="38100" anchor="ctr"/>
+                </a:tc>
+                <a:tc>
+                  <a:txBody>
+                    <a:bodyPr/>
+                    <a:lstStyle/>
+                    <a:p>
+                      <a:pPr algn="ctr" fontAlgn="ctr"/>
+                      <a:r>
+                        <a:rPr lang="en-US" sz="1100" u="none" strike="noStrike" dirty="0">
+                          <a:effectLst/>
+                        </a:rPr>
+                        <a:t>97.1</a:t>
+                      </a:r>
+                      <a:endParaRPr lang="en-US" sz="1100" b="0" i="0" u="none" strike="noStrike" dirty="0">
+                        <a:solidFill>
+                          <a:srgbClr val="000000"/>
+                        </a:solidFill>
+                        <a:effectLst/>
+                        <a:latin typeface="Segoe UI" panose="020B0502040204020203" pitchFamily="34" charset="0"/>
+                      </a:endParaRPr>
+                    </a:p>
+                  </a:txBody>
+                  <a:tcPr marL="9525" marR="9525" marT="38100" marB="38100" anchor="ctr"/>
+                </a:tc>
+                <a:extLst>
+                  <a:ext uri="{0D108BD9-81ED-4DB2-BD59-A6C34878D82A}">
+                    <a16:rowId xmlns:a16="http://schemas.microsoft.com/office/drawing/2014/main" val="2041182056"/>
+                  </a:ext>
+                </a:extLst>
+              </a:tr>
+              <a:tr h="400746">
+                <a:tc>
+                  <a:txBody>
+                    <a:bodyPr/>
+                    <a:lstStyle/>
+                    <a:p>
+                      <a:pPr algn="ctr" fontAlgn="ctr"/>
+                      <a:r>
+                        <a:rPr lang="en-US" sz="1100" u="none" strike="noStrike" dirty="0">
+                          <a:effectLst/>
+                        </a:rPr>
+                        <a:t>CatBoost</a:t>
+                      </a:r>
+                      <a:endParaRPr lang="en-US" sz="1100" b="0" i="0" u="none" strike="noStrike" dirty="0">
+                        <a:solidFill>
+                          <a:srgbClr val="000000"/>
+                        </a:solidFill>
+                        <a:effectLst/>
+                        <a:latin typeface="Segoe UI" panose="020B0502040204020203" pitchFamily="34" charset="0"/>
+                      </a:endParaRPr>
+                    </a:p>
+                  </a:txBody>
+                  <a:tcPr marL="9525" marR="9525" marT="38100" marB="38100" anchor="ctr"/>
+                </a:tc>
+                <a:tc>
+                  <a:txBody>
+                    <a:bodyPr/>
+                    <a:lstStyle/>
+                    <a:p>
+                      <a:pPr algn="ctr" fontAlgn="ctr"/>
+                      <a:r>
+                        <a:rPr lang="en-US" sz="1100" u="none" strike="noStrike" dirty="0">
+                          <a:effectLst/>
+                        </a:rPr>
+                        <a:t>97.1</a:t>
+                      </a:r>
+                      <a:endParaRPr lang="en-US" sz="1100" b="0" i="0" u="none" strike="noStrike" dirty="0">
+                        <a:solidFill>
+                          <a:srgbClr val="000000"/>
+                        </a:solidFill>
+                        <a:effectLst/>
+                        <a:latin typeface="Segoe UI" panose="020B0502040204020203" pitchFamily="34" charset="0"/>
+                      </a:endParaRPr>
+                    </a:p>
+                  </a:txBody>
+                  <a:tcPr marL="9525" marR="9525" marT="38100" marB="38100" anchor="ctr"/>
+                </a:tc>
+                <a:extLst>
+                  <a:ext uri="{0D108BD9-81ED-4DB2-BD59-A6C34878D82A}">
+                    <a16:rowId xmlns:a16="http://schemas.microsoft.com/office/drawing/2014/main" val="3837326114"/>
+                  </a:ext>
+                </a:extLst>
+              </a:tr>
+              <a:tr h="400746">
+                <a:tc>
+                  <a:txBody>
+                    <a:bodyPr/>
+                    <a:lstStyle/>
+                    <a:p>
+                      <a:pPr algn="ctr" fontAlgn="ctr"/>
+                      <a:r>
+                        <a:rPr lang="en-US" sz="1100" u="none" strike="noStrike" dirty="0">
+                          <a:effectLst/>
+                        </a:rPr>
+                        <a:t>RandomForest</a:t>
+                      </a:r>
+                      <a:endParaRPr lang="en-US" sz="1100" b="0" i="0" u="none" strike="noStrike" dirty="0">
+                        <a:solidFill>
+                          <a:srgbClr val="000000"/>
+                        </a:solidFill>
+                        <a:effectLst/>
+                        <a:latin typeface="Segoe UI" panose="020B0502040204020203" pitchFamily="34" charset="0"/>
+                      </a:endParaRPr>
+                    </a:p>
+                  </a:txBody>
+                  <a:tcPr marL="9525" marR="9525" marT="38100" marB="38100" anchor="ctr"/>
+                </a:tc>
+                <a:tc>
+                  <a:txBody>
+                    <a:bodyPr/>
+                    <a:lstStyle/>
+                    <a:p>
+                      <a:pPr algn="ctr" fontAlgn="ctr"/>
+                      <a:r>
+                        <a:rPr lang="en-US" sz="1100" u="none" strike="noStrike" dirty="0">
+                          <a:effectLst/>
+                        </a:rPr>
+                        <a:t>96.6</a:t>
+                      </a:r>
+                      <a:endParaRPr lang="en-US" sz="1100" b="0" i="0" u="none" strike="noStrike" dirty="0">
+                        <a:solidFill>
+                          <a:srgbClr val="000000"/>
+                        </a:solidFill>
+                        <a:effectLst/>
+                        <a:latin typeface="Segoe UI" panose="020B0502040204020203" pitchFamily="34" charset="0"/>
+                      </a:endParaRPr>
+                    </a:p>
+                  </a:txBody>
+                  <a:tcPr marL="9525" marR="9525" marT="38100" marB="38100" anchor="ctr"/>
+                </a:tc>
+                <a:extLst>
+                  <a:ext uri="{0D108BD9-81ED-4DB2-BD59-A6C34878D82A}">
+                    <a16:rowId xmlns:a16="http://schemas.microsoft.com/office/drawing/2014/main" val="1762254307"/>
+                  </a:ext>
+                </a:extLst>
+              </a:tr>
+            </a:tbl>
+          </a:graphicData>
+        </a:graphic>
+      </p:graphicFrame>
       <p:pic>
         <p:nvPicPr>
-          <p:cNvPr id="19" name="Picture 18">
-            <a:extLst>
-              <a:ext uri="{FF2B5EF4-FFF2-40B4-BE49-F238E27FC236}">
-                <a16:creationId xmlns:a16="http://schemas.microsoft.com/office/drawing/2014/main" id="{DE37775B-D5E0-6544-4D3D-2A544BABD0AC}"/>
+          <p:cNvPr id="18" name="Picture 17">
+            <a:extLst>
+              <a:ext uri="{FF2B5EF4-FFF2-40B4-BE49-F238E27FC236}">
+                <a16:creationId xmlns:a16="http://schemas.microsoft.com/office/drawing/2014/main" id="{3F8E85AB-D756-BFE8-AF7B-756440DF8CB2}"/>
               </a:ext>
             </a:extLst>
           </p:cNvPr>
@@ -8726,25 +9106,70 @@
           <p:nvPr/>
         </p:nvPicPr>
         <p:blipFill>
-          <a:blip r:embed="rId6"/>
+          <a:blip r:embed="rId4"/>
           <a:stretch>
             <a:fillRect/>
           </a:stretch>
         </p:blipFill>
         <p:spPr>
           <a:xfrm>
-            <a:off x="6303770" y="1048834"/>
-            <a:ext cx="5636769" cy="4742330"/>
+            <a:off x="3503594" y="1483276"/>
+            <a:ext cx="4014613" cy="4710874"/>
           </a:xfrm>
           <a:prstGeom prst="rect">
             <a:avLst/>
           </a:prstGeom>
         </p:spPr>
       </p:pic>
+      <p:sp>
+        <p:nvSpPr>
+          <p:cNvPr id="19" name="TextBox 18">
+            <a:extLst>
+              <a:ext uri="{FF2B5EF4-FFF2-40B4-BE49-F238E27FC236}">
+                <a16:creationId xmlns:a16="http://schemas.microsoft.com/office/drawing/2014/main" id="{1A96004D-0CFE-56D4-5C4E-F7DBC113D454}"/>
+              </a:ext>
+            </a:extLst>
+          </p:cNvPr>
+          <p:cNvSpPr txBox="1"/>
+          <p:nvPr/>
+        </p:nvSpPr>
+        <p:spPr>
+          <a:xfrm>
+            <a:off x="3883764" y="1226372"/>
+            <a:ext cx="2574186" cy="830997"/>
+          </a:xfrm>
+          <a:prstGeom prst="rect">
+            <a:avLst/>
+          </a:prstGeom>
+          <a:noFill/>
+        </p:spPr>
+        <p:txBody>
+          <a:bodyPr wrap="square" rtlCol="0">
+            <a:spAutoFit/>
+          </a:bodyPr>
+          <a:lstStyle/>
+          <a:p>
+            <a:pPr algn="ctr" defTabSz="329184">
+              <a:spcAft>
+                <a:spcPts val="600"/>
+              </a:spcAft>
+            </a:pPr>
+            <a:r>
+              <a:rPr lang="en-US" sz="1600" b="1" kern="1200" dirty="0">
+                <a:latin typeface="+mn-lt"/>
+                <a:ea typeface="+mn-ea"/>
+                <a:cs typeface="+mn-cs"/>
+              </a:rPr>
+              <a:t>Confusion Matrix of the Best Model (XGB) After Feature Selection</a:t>
+            </a:r>
+            <a:endParaRPr lang="en-US" sz="1600" b="1" dirty="0"/>
+          </a:p>
+        </p:txBody>
+      </p:sp>
     </p:spTree>
     <p:extLst>
       <p:ext uri="{BB962C8B-B14F-4D97-AF65-F5344CB8AC3E}">
-        <p14:creationId xmlns:p14="http://schemas.microsoft.com/office/powerpoint/2010/main" val="3515019896"/>
+        <p14:creationId xmlns:p14="http://schemas.microsoft.com/office/powerpoint/2010/main" val="1653128091"/>
       </p:ext>
     </p:extLst>
   </p:cSld>
@@ -8767,7 +9192,7 @@
         <p:cNvPr id="1" name="">
           <a:extLst>
             <a:ext uri="{FF2B5EF4-FFF2-40B4-BE49-F238E27FC236}">
-              <a16:creationId xmlns:a16="http://schemas.microsoft.com/office/drawing/2014/main" id="{95BFB7E2-3ED9-F812-C28D-04766C1850F8}"/>
+              <a16:creationId xmlns:a16="http://schemas.microsoft.com/office/drawing/2014/main" id="{D82CCC6C-FC1B-E142-B129-ECBADC40549D}"/>
             </a:ext>
           </a:extLst>
         </p:cNvPr>
@@ -8787,7 +9212,7 @@
           <p:cNvPr id="2" name="Title 1">
             <a:extLst>
               <a:ext uri="{FF2B5EF4-FFF2-40B4-BE49-F238E27FC236}">
-                <a16:creationId xmlns:a16="http://schemas.microsoft.com/office/drawing/2014/main" id="{72FDC675-7E5A-D193-3EB4-65FD359FAE49}"/>
+                <a16:creationId xmlns:a16="http://schemas.microsoft.com/office/drawing/2014/main" id="{94DEBA9B-46A1-B461-9ADA-9FBBC6117375}"/>
               </a:ext>
             </a:extLst>
           </p:cNvPr>
@@ -8800,8 +9225,8 @@
         </p:nvSpPr>
         <p:spPr>
           <a:xfrm>
-            <a:off x="3624263" y="944441"/>
-            <a:ext cx="6181725" cy="592137"/>
+            <a:off x="3473832" y="457707"/>
+            <a:ext cx="5244337" cy="592137"/>
           </a:xfrm>
         </p:spPr>
         <p:txBody>
@@ -8811,17 +9236,9 @@
           <a:lstStyle/>
           <a:p>
             <a:r>
-              <a:rPr lang="en-US" sz="3200" dirty="0"/>
-              <a:t>Why Digital Twin for </a:t>
+              <a:rPr lang="en-US" sz="3200" b="1" dirty="0"/>
+              <a:t>Business Recommendation</a:t>
             </a:r>
-            <a:r>
-              <a:rPr lang="en-US" sz="3200" dirty="0" err="1"/>
-              <a:t>Kiverco</a:t>
-            </a:r>
-            <a:r>
-              <a:rPr lang="en-US" sz="3200" dirty="0"/>
-              <a:t> ?</a:t>
-            </a:r>
           </a:p>
         </p:txBody>
       </p:sp>
@@ -8830,7 +9247,7 @@
           <p:cNvPr id="4" name="Title 1">
             <a:extLst>
               <a:ext uri="{FF2B5EF4-FFF2-40B4-BE49-F238E27FC236}">
-                <a16:creationId xmlns:a16="http://schemas.microsoft.com/office/drawing/2014/main" id="{13616489-A287-75AF-6594-B78F883A7D7D}"/>
+                <a16:creationId xmlns:a16="http://schemas.microsoft.com/office/drawing/2014/main" id="{E0C6FA1D-7F84-E4BC-745C-0282640C82D4}"/>
               </a:ext>
             </a:extLst>
           </p:cNvPr>
@@ -8841,8 +9258,8 @@
         </p:nvSpPr>
         <p:spPr>
           <a:xfrm>
-            <a:off x="896720" y="1920698"/>
-            <a:ext cx="3562351" cy="405861"/>
+            <a:off x="1133473" y="5610665"/>
+            <a:ext cx="10201355" cy="444364"/>
           </a:xfrm>
           <a:prstGeom prst="rect">
             <a:avLst/>
@@ -8874,17 +9291,56 @@
           <a:p>
             <a:r>
               <a:rPr lang="en-US" sz="2000" dirty="0"/>
-              <a:t>Performance Monitoring</a:t>
+              <a:t>Detect early customer inactivity and implement targeted advertising strategies to re-engage them</a:t>
             </a:r>
           </a:p>
         </p:txBody>
       </p:sp>
-      <p:sp>
-        <p:nvSpPr>
-          <p:cNvPr id="5" name="Title 1">
-            <a:extLst>
-              <a:ext uri="{FF2B5EF4-FFF2-40B4-BE49-F238E27FC236}">
-                <a16:creationId xmlns:a16="http://schemas.microsoft.com/office/drawing/2014/main" id="{3941655A-466C-B516-04C3-EEE32DD43E88}"/>
+      <p:pic>
+        <p:nvPicPr>
+          <p:cNvPr id="15" name="Graphic 14" descr="Arrow: Straight with solid fill">
+            <a:extLst>
+              <a:ext uri="{FF2B5EF4-FFF2-40B4-BE49-F238E27FC236}">
+                <a16:creationId xmlns:a16="http://schemas.microsoft.com/office/drawing/2014/main" id="{37A6EACE-F8C4-55F1-AEFC-3FD427981E38}"/>
+              </a:ext>
+            </a:extLst>
+          </p:cNvPr>
+          <p:cNvPicPr>
+            <a:picLocks noChangeAspect="1"/>
+          </p:cNvPicPr>
+          <p:nvPr/>
+        </p:nvPicPr>
+        <p:blipFill>
+          <a:blip r:embed="rId3">
+            <a:extLst>
+              <a:ext uri="{28A0092B-C50C-407E-A947-70E740481C1C}">
+                <a14:useLocalDpi xmlns:a14="http://schemas.microsoft.com/office/drawing/2010/main" val="0"/>
+              </a:ext>
+              <a:ext uri="{96DAC541-7B7A-43D3-8B79-37D633B846F1}">
+                <asvg:svgBlip xmlns:asvg="http://schemas.microsoft.com/office/drawing/2016/SVG/main" r:embed="rId4"/>
+              </a:ext>
+            </a:extLst>
+          </a:blip>
+          <a:stretch>
+            <a:fillRect/>
+          </a:stretch>
+        </p:blipFill>
+        <p:spPr>
+          <a:xfrm rot="10800000">
+            <a:off x="647066" y="1313419"/>
+            <a:ext cx="486407" cy="486407"/>
+          </a:xfrm>
+          <a:prstGeom prst="rect">
+            <a:avLst/>
+          </a:prstGeom>
+        </p:spPr>
+      </p:pic>
+      <p:sp>
+        <p:nvSpPr>
+          <p:cNvPr id="6" name="Title 1">
+            <a:extLst>
+              <a:ext uri="{FF2B5EF4-FFF2-40B4-BE49-F238E27FC236}">
+                <a16:creationId xmlns:a16="http://schemas.microsoft.com/office/drawing/2014/main" id="{1F6EB268-B2F2-B5BA-91DC-4EB0BE809B37}"/>
               </a:ext>
             </a:extLst>
           </p:cNvPr>
@@ -8895,8 +9351,8 @@
         </p:nvSpPr>
         <p:spPr>
           <a:xfrm>
-            <a:off x="1038223" y="3023139"/>
-            <a:ext cx="3257551" cy="405861"/>
+            <a:off x="890269" y="1336082"/>
+            <a:ext cx="6731037" cy="400110"/>
           </a:xfrm>
           <a:prstGeom prst="rect">
             <a:avLst/>
@@ -8928,17 +9384,17 @@
           <a:p>
             <a:r>
               <a:rPr lang="en-US" sz="2000" dirty="0"/>
-              <a:t>Predictive Maintenance</a:t>
+              <a:t>Improve service quality to reduce complaints and failures</a:t>
             </a:r>
           </a:p>
         </p:txBody>
       </p:sp>
       <p:sp>
         <p:nvSpPr>
-          <p:cNvPr id="8" name="Title 1">
-            <a:extLst>
-              <a:ext uri="{FF2B5EF4-FFF2-40B4-BE49-F238E27FC236}">
-                <a16:creationId xmlns:a16="http://schemas.microsoft.com/office/drawing/2014/main" id="{DE7A924C-A7A7-8041-B31E-E4C69CB38730}"/>
+          <p:cNvPr id="7" name="Title 1">
+            <a:extLst>
+              <a:ext uri="{FF2B5EF4-FFF2-40B4-BE49-F238E27FC236}">
+                <a16:creationId xmlns:a16="http://schemas.microsoft.com/office/drawing/2014/main" id="{FA28EF84-7E0E-92D6-A697-3EE8FEF0C391}"/>
               </a:ext>
             </a:extLst>
           </p:cNvPr>
@@ -8949,8 +9405,8 @@
         </p:nvSpPr>
         <p:spPr>
           <a:xfrm>
-            <a:off x="733423" y="4077129"/>
-            <a:ext cx="3562351" cy="370467"/>
+            <a:off x="1228724" y="2190999"/>
+            <a:ext cx="4349788" cy="400110"/>
           </a:xfrm>
           <a:prstGeom prst="rect">
             <a:avLst/>
@@ -8982,22 +9438,17 @@
           <a:p>
             <a:r>
               <a:rPr lang="en-US" sz="2000" dirty="0"/>
-              <a:t>Process </a:t>
+              <a:t>Offer incentives to new/short-term users</a:t>
             </a:r>
-            <a:r>
-              <a:rPr lang="en-US" sz="2000" dirty="0" err="1"/>
-              <a:t>Optimisation</a:t>
-            </a:r>
-            <a:endParaRPr lang="en-US" sz="2000" dirty="0"/>
           </a:p>
         </p:txBody>
       </p:sp>
       <p:sp>
         <p:nvSpPr>
-          <p:cNvPr id="3" name="Title 1">
-            <a:extLst>
-              <a:ext uri="{FF2B5EF4-FFF2-40B4-BE49-F238E27FC236}">
-                <a16:creationId xmlns:a16="http://schemas.microsoft.com/office/drawing/2014/main" id="{800DC79C-0237-11CD-495F-70395F1179E0}"/>
+          <p:cNvPr id="9" name="Title 1">
+            <a:extLst>
+              <a:ext uri="{FF2B5EF4-FFF2-40B4-BE49-F238E27FC236}">
+                <a16:creationId xmlns:a16="http://schemas.microsoft.com/office/drawing/2014/main" id="{B43D84A6-2B52-ECBC-63B7-F1A99159D1C6}"/>
               </a:ext>
             </a:extLst>
           </p:cNvPr>
@@ -9008,8 +9459,8 @@
         </p:nvSpPr>
         <p:spPr>
           <a:xfrm>
-            <a:off x="896720" y="5161816"/>
-            <a:ext cx="7632472" cy="370467"/>
+            <a:off x="1133473" y="3045916"/>
+            <a:ext cx="5120514" cy="400110"/>
           </a:xfrm>
           <a:prstGeom prst="rect">
             <a:avLst/>
@@ -9041,285 +9492,17 @@
           <a:p>
             <a:r>
               <a:rPr lang="en-US" sz="2000" dirty="0"/>
-              <a:t>Case Study- Construction and Demolition Waste Recycling Plant</a:t>
+              <a:t>Personalize retention for high-value customers</a:t>
             </a:r>
           </a:p>
         </p:txBody>
       </p:sp>
-      <p:pic>
-        <p:nvPicPr>
-          <p:cNvPr id="7" name="Picture 6" descr="A large industrial building with machinery&#10;&#10;AI-generated content may be incorrect.">
-            <a:extLst>
-              <a:ext uri="{FF2B5EF4-FFF2-40B4-BE49-F238E27FC236}">
-                <a16:creationId xmlns:a16="http://schemas.microsoft.com/office/drawing/2014/main" id="{9877A6DA-B763-B2B8-AFB1-C9E6043F32E5}"/>
-              </a:ext>
-            </a:extLst>
-          </p:cNvPr>
-          <p:cNvPicPr>
-            <a:picLocks noChangeAspect="1"/>
-          </p:cNvPicPr>
-          <p:nvPr/>
-        </p:nvPicPr>
-        <p:blipFill>
-          <a:blip r:embed="rId3">
-            <a:extLst>
-              <a:ext uri="{28A0092B-C50C-407E-A947-70E740481C1C}">
-                <a14:useLocalDpi xmlns:a14="http://schemas.microsoft.com/office/drawing/2010/main" val="0"/>
-              </a:ext>
-            </a:extLst>
-          </a:blip>
-          <a:stretch>
-            <a:fillRect/>
-          </a:stretch>
-        </p:blipFill>
-        <p:spPr>
-          <a:xfrm>
-            <a:off x="6096000" y="1604385"/>
-            <a:ext cx="5474218" cy="3347877"/>
-          </a:xfrm>
-          <a:prstGeom prst="rect">
-            <a:avLst/>
-          </a:prstGeom>
-        </p:spPr>
-      </p:pic>
-      <p:pic>
-        <p:nvPicPr>
-          <p:cNvPr id="9" name="Graphic 8" descr="Arrow: Straight with solid fill">
-            <a:extLst>
-              <a:ext uri="{FF2B5EF4-FFF2-40B4-BE49-F238E27FC236}">
-                <a16:creationId xmlns:a16="http://schemas.microsoft.com/office/drawing/2014/main" id="{388D9AD9-06D2-E7F0-AE09-5E0A187D6F5B}"/>
-              </a:ext>
-            </a:extLst>
-          </p:cNvPr>
-          <p:cNvPicPr>
-            <a:picLocks noChangeAspect="1"/>
-          </p:cNvPicPr>
-          <p:nvPr/>
-        </p:nvPicPr>
-        <p:blipFill>
-          <a:blip r:embed="rId4">
-            <a:extLst>
-              <a:ext uri="{28A0092B-C50C-407E-A947-70E740481C1C}">
-                <a14:useLocalDpi xmlns:a14="http://schemas.microsoft.com/office/drawing/2010/main" val="0"/>
-              </a:ext>
-              <a:ext uri="{96DAC541-7B7A-43D3-8B79-37D633B846F1}">
-                <asvg:svgBlip xmlns:asvg="http://schemas.microsoft.com/office/drawing/2016/SVG/main" r:embed="rId5"/>
-              </a:ext>
-            </a:extLst>
-          </a:blip>
-          <a:stretch>
-            <a:fillRect/>
-          </a:stretch>
-        </p:blipFill>
-        <p:spPr>
-          <a:xfrm rot="10800000">
-            <a:off x="586532" y="1847444"/>
-            <a:ext cx="620383" cy="620383"/>
-          </a:xfrm>
-          <a:prstGeom prst="rect">
-            <a:avLst/>
-          </a:prstGeom>
-        </p:spPr>
-      </p:pic>
-      <p:pic>
-        <p:nvPicPr>
-          <p:cNvPr id="10" name="Graphic 9" descr="Arrow: Straight with solid fill">
-            <a:extLst>
-              <a:ext uri="{FF2B5EF4-FFF2-40B4-BE49-F238E27FC236}">
-                <a16:creationId xmlns:a16="http://schemas.microsoft.com/office/drawing/2014/main" id="{F79F78F4-7EFC-1312-B778-C9D9B198BF83}"/>
-              </a:ext>
-            </a:extLst>
-          </p:cNvPr>
-          <p:cNvPicPr>
-            <a:picLocks noChangeAspect="1"/>
-          </p:cNvPicPr>
-          <p:nvPr/>
-        </p:nvPicPr>
-        <p:blipFill>
-          <a:blip r:embed="rId4">
-            <a:extLst>
-              <a:ext uri="{28A0092B-C50C-407E-A947-70E740481C1C}">
-                <a14:useLocalDpi xmlns:a14="http://schemas.microsoft.com/office/drawing/2010/main" val="0"/>
-              </a:ext>
-              <a:ext uri="{96DAC541-7B7A-43D3-8B79-37D633B846F1}">
-                <asvg:svgBlip xmlns:asvg="http://schemas.microsoft.com/office/drawing/2016/SVG/main" r:embed="rId5"/>
-              </a:ext>
-            </a:extLst>
-          </a:blip>
-          <a:stretch>
-            <a:fillRect/>
-          </a:stretch>
-        </p:blipFill>
-        <p:spPr>
-          <a:xfrm rot="10800000">
-            <a:off x="586531" y="2901434"/>
-            <a:ext cx="620383" cy="620383"/>
-          </a:xfrm>
-          <a:prstGeom prst="rect">
-            <a:avLst/>
-          </a:prstGeom>
-        </p:spPr>
-      </p:pic>
-      <p:pic>
-        <p:nvPicPr>
-          <p:cNvPr id="11" name="Graphic 10" descr="Arrow: Straight with solid fill">
-            <a:extLst>
-              <a:ext uri="{FF2B5EF4-FFF2-40B4-BE49-F238E27FC236}">
-                <a16:creationId xmlns:a16="http://schemas.microsoft.com/office/drawing/2014/main" id="{BF832828-B110-0157-E1C9-0FF9715F1796}"/>
-              </a:ext>
-            </a:extLst>
-          </p:cNvPr>
-          <p:cNvPicPr>
-            <a:picLocks noChangeAspect="1"/>
-          </p:cNvPicPr>
-          <p:nvPr/>
-        </p:nvPicPr>
-        <p:blipFill>
-          <a:blip r:embed="rId4">
-            <a:extLst>
-              <a:ext uri="{28A0092B-C50C-407E-A947-70E740481C1C}">
-                <a14:useLocalDpi xmlns:a14="http://schemas.microsoft.com/office/drawing/2010/main" val="0"/>
-              </a:ext>
-              <a:ext uri="{96DAC541-7B7A-43D3-8B79-37D633B846F1}">
-                <asvg:svgBlip xmlns:asvg="http://schemas.microsoft.com/office/drawing/2016/SVG/main" r:embed="rId5"/>
-              </a:ext>
-            </a:extLst>
-          </a:blip>
-          <a:stretch>
-            <a:fillRect/>
-          </a:stretch>
-        </p:blipFill>
-        <p:spPr>
-          <a:xfrm rot="10800000">
-            <a:off x="586530" y="3955424"/>
-            <a:ext cx="620383" cy="620383"/>
-          </a:xfrm>
-          <a:prstGeom prst="rect">
-            <a:avLst/>
-          </a:prstGeom>
-        </p:spPr>
-      </p:pic>
-      <p:pic>
-        <p:nvPicPr>
-          <p:cNvPr id="12" name="Graphic 11" descr="Arrow: Straight with solid fill">
-            <a:extLst>
-              <a:ext uri="{FF2B5EF4-FFF2-40B4-BE49-F238E27FC236}">
-                <a16:creationId xmlns:a16="http://schemas.microsoft.com/office/drawing/2014/main" id="{4B6CF351-E866-45AD-0A57-CCB5063BA7E9}"/>
-              </a:ext>
-            </a:extLst>
-          </p:cNvPr>
-          <p:cNvPicPr>
-            <a:picLocks noChangeAspect="1"/>
-          </p:cNvPicPr>
-          <p:nvPr/>
-        </p:nvPicPr>
-        <p:blipFill>
-          <a:blip r:embed="rId4">
-            <a:extLst>
-              <a:ext uri="{28A0092B-C50C-407E-A947-70E740481C1C}">
-                <a14:useLocalDpi xmlns:a14="http://schemas.microsoft.com/office/drawing/2010/main" val="0"/>
-              </a:ext>
-              <a:ext uri="{96DAC541-7B7A-43D3-8B79-37D633B846F1}">
-                <asvg:svgBlip xmlns:asvg="http://schemas.microsoft.com/office/drawing/2016/SVG/main" r:embed="rId5"/>
-              </a:ext>
-            </a:extLst>
-          </a:blip>
-          <a:stretch>
-            <a:fillRect/>
-          </a:stretch>
-        </p:blipFill>
-        <p:spPr>
-          <a:xfrm rot="10800000">
-            <a:off x="586529" y="5009414"/>
-            <a:ext cx="620383" cy="620383"/>
-          </a:xfrm>
-          <a:prstGeom prst="rect">
-            <a:avLst/>
-          </a:prstGeom>
-        </p:spPr>
-      </p:pic>
-    </p:spTree>
-    <p:extLst>
-      <p:ext uri="{BB962C8B-B14F-4D97-AF65-F5344CB8AC3E}">
-        <p14:creationId xmlns:p14="http://schemas.microsoft.com/office/powerpoint/2010/main" val="4204621841"/>
-      </p:ext>
-    </p:extLst>
-  </p:cSld>
-  <p:clrMapOvr>
-    <a:overrideClrMapping bg1="lt1" tx1="dk1" bg2="lt2" tx2="dk2" accent1="accent1" accent2="accent2" accent3="accent3" accent4="accent4" accent5="accent5" accent6="accent6" hlink="hlink" folHlink="folHlink"/>
-  </p:clrMapOvr>
-</p:sld>
-</file>
-
-<file path=ppt/slides/slide12.xml><?xml version="1.0" encoding="utf-8"?>
-<p:sld xmlns:a="http://schemas.openxmlformats.org/drawingml/2006/main" xmlns:r="http://schemas.openxmlformats.org/officeDocument/2006/relationships" xmlns:p="http://schemas.openxmlformats.org/presentationml/2006/main">
-  <p:cSld>
-    <p:bg>
-      <p:bgRef idx="1001">
-        <a:schemeClr val="bg1"/>
-      </p:bgRef>
-    </p:bg>
-    <p:spTree>
-      <p:nvGrpSpPr>
-        <p:cNvPr id="1" name="">
-          <a:extLst>
-            <a:ext uri="{FF2B5EF4-FFF2-40B4-BE49-F238E27FC236}">
-              <a16:creationId xmlns:a16="http://schemas.microsoft.com/office/drawing/2014/main" id="{3BFA597C-71C8-7576-F0FC-26D70DCBA151}"/>
-            </a:ext>
-          </a:extLst>
-        </p:cNvPr>
-        <p:cNvGrpSpPr/>
-        <p:nvPr/>
-      </p:nvGrpSpPr>
-      <p:grpSpPr>
-        <a:xfrm>
-          <a:off x="0" y="0"/>
-          <a:ext cx="0" cy="0"/>
-          <a:chOff x="0" y="0"/>
-          <a:chExt cx="0" cy="0"/>
-        </a:xfrm>
-      </p:grpSpPr>
-      <p:sp>
-        <p:nvSpPr>
-          <p:cNvPr id="2" name="Title 1">
-            <a:extLst>
-              <a:ext uri="{FF2B5EF4-FFF2-40B4-BE49-F238E27FC236}">
-                <a16:creationId xmlns:a16="http://schemas.microsoft.com/office/drawing/2014/main" id="{0E10B81C-B682-67B9-3F14-C478A7EF9920}"/>
-              </a:ext>
-            </a:extLst>
-          </p:cNvPr>
-          <p:cNvSpPr>
-            <a:spLocks noGrp="1"/>
-          </p:cNvSpPr>
-          <p:nvPr>
-            <p:ph type="ctrTitle" idx="4294967295"/>
-          </p:nvPr>
-        </p:nvSpPr>
-        <p:spPr>
-          <a:xfrm>
-            <a:off x="3648075" y="914627"/>
-            <a:ext cx="6181725" cy="592137"/>
-          </a:xfrm>
-        </p:spPr>
-        <p:txBody>
-          <a:bodyPr>
-            <a:normAutofit/>
-          </a:bodyPr>
-          <a:lstStyle/>
-          <a:p>
-            <a:r>
-              <a:rPr lang="en-US" sz="3200" dirty="0"/>
-              <a:t>Implementation Challenges</a:t>
-            </a:r>
-          </a:p>
-        </p:txBody>
-      </p:sp>
-      <p:sp>
-        <p:nvSpPr>
-          <p:cNvPr id="4" name="Title 1">
-            <a:extLst>
-              <a:ext uri="{FF2B5EF4-FFF2-40B4-BE49-F238E27FC236}">
-                <a16:creationId xmlns:a16="http://schemas.microsoft.com/office/drawing/2014/main" id="{D42CE138-86C6-137F-D699-394B397AE2F2}"/>
+      <p:sp>
+        <p:nvSpPr>
+          <p:cNvPr id="13" name="Title 1">
+            <a:extLst>
+              <a:ext uri="{FF2B5EF4-FFF2-40B4-BE49-F238E27FC236}">
+                <a16:creationId xmlns:a16="http://schemas.microsoft.com/office/drawing/2014/main" id="{231FC6D4-3194-2668-0E64-A4F43CE64C5F}"/>
               </a:ext>
             </a:extLst>
           </p:cNvPr>
@@ -9330,8 +9513,8 @@
         </p:nvSpPr>
         <p:spPr>
           <a:xfrm>
-            <a:off x="1198678" y="1608357"/>
-            <a:ext cx="4171950" cy="591733"/>
+            <a:off x="1133473" y="3900833"/>
+            <a:ext cx="4873662" cy="400110"/>
           </a:xfrm>
           <a:prstGeom prst="rect">
             <a:avLst/>
@@ -9363,17 +9546,17 @@
           <a:p>
             <a:r>
               <a:rPr lang="en-US" sz="2000" dirty="0"/>
-              <a:t>Integration with existing system</a:t>
+              <a:t>Promote usage through targeted engagement</a:t>
             </a:r>
           </a:p>
         </p:txBody>
       </p:sp>
       <p:sp>
         <p:nvSpPr>
-          <p:cNvPr id="3" name="Title 1">
-            <a:extLst>
-              <a:ext uri="{FF2B5EF4-FFF2-40B4-BE49-F238E27FC236}">
-                <a16:creationId xmlns:a16="http://schemas.microsoft.com/office/drawing/2014/main" id="{A41C4763-F01B-B3FA-A12B-A82BD2EAE96B}"/>
+          <p:cNvPr id="14" name="Title 1">
+            <a:extLst>
+              <a:ext uri="{FF2B5EF4-FFF2-40B4-BE49-F238E27FC236}">
+                <a16:creationId xmlns:a16="http://schemas.microsoft.com/office/drawing/2014/main" id="{B51F2437-D628-A141-2D7B-D9195A346CAE}"/>
               </a:ext>
             </a:extLst>
           </p:cNvPr>
@@ -9384,8 +9567,8 @@
         </p:nvSpPr>
         <p:spPr>
           <a:xfrm>
-            <a:off x="933449" y="2861602"/>
-            <a:ext cx="4171950" cy="591733"/>
+            <a:off x="1048952" y="4755750"/>
+            <a:ext cx="5828097" cy="400110"/>
           </a:xfrm>
           <a:prstGeom prst="rect">
             <a:avLst/>
@@ -9417,141 +9600,210 @@
           <a:p>
             <a:r>
               <a:rPr lang="en-US" sz="2000" dirty="0"/>
-              <a:t>Data Collection and Quality</a:t>
+              <a:t>Offer a reduced monthly plan for contract customers</a:t>
             </a:r>
           </a:p>
         </p:txBody>
       </p:sp>
-      <p:sp>
-        <p:nvSpPr>
-          <p:cNvPr id="6" name="Title 1">
-            <a:extLst>
-              <a:ext uri="{FF2B5EF4-FFF2-40B4-BE49-F238E27FC236}">
-                <a16:creationId xmlns:a16="http://schemas.microsoft.com/office/drawing/2014/main" id="{2E41A0B6-CC9F-C226-0DED-8AC4AD3FD500}"/>
-              </a:ext>
-            </a:extLst>
-          </p:cNvPr>
-          <p:cNvSpPr txBox="1">
-            <a:spLocks/>
-          </p:cNvSpPr>
+      <p:pic>
+        <p:nvPicPr>
+          <p:cNvPr id="17" name="Graphic 16" descr="Arrow: Straight with solid fill">
+            <a:extLst>
+              <a:ext uri="{FF2B5EF4-FFF2-40B4-BE49-F238E27FC236}">
+                <a16:creationId xmlns:a16="http://schemas.microsoft.com/office/drawing/2014/main" id="{4B4D1652-B0E5-5400-89E9-60333AFAA86A}"/>
+              </a:ext>
+            </a:extLst>
+          </p:cNvPr>
+          <p:cNvPicPr>
+            <a:picLocks noChangeAspect="1"/>
+          </p:cNvPicPr>
           <p:nvPr/>
-        </p:nvSpPr>
+        </p:nvPicPr>
+        <p:blipFill>
+          <a:blip r:embed="rId3">
+            <a:extLst>
+              <a:ext uri="{28A0092B-C50C-407E-A947-70E740481C1C}">
+                <a14:useLocalDpi xmlns:a14="http://schemas.microsoft.com/office/drawing/2010/main" val="0"/>
+              </a:ext>
+              <a:ext uri="{96DAC541-7B7A-43D3-8B79-37D633B846F1}">
+                <asvg:svgBlip xmlns:asvg="http://schemas.microsoft.com/office/drawing/2016/SVG/main" r:embed="rId4"/>
+              </a:ext>
+            </a:extLst>
+          </a:blip>
+          <a:stretch>
+            <a:fillRect/>
+          </a:stretch>
+        </p:blipFill>
         <p:spPr>
-          <a:xfrm>
-            <a:off x="1619248" y="2540371"/>
-            <a:ext cx="8115301" cy="591733"/>
+          <a:xfrm rot="10800000">
+            <a:off x="647065" y="2176833"/>
+            <a:ext cx="486407" cy="486407"/>
           </a:xfrm>
           <a:prstGeom prst="rect">
             <a:avLst/>
           </a:prstGeom>
         </p:spPr>
-        <p:txBody>
-          <a:bodyPr vert="horz" lIns="91440" tIns="45720" rIns="91440" bIns="45720" rtlCol="0" anchor="b">
-            <a:noAutofit/>
-          </a:bodyPr>
-          <a:lstStyle>
-            <a:lvl1pPr algn="ctr" defTabSz="914400" rtl="0" eaLnBrk="1" latinLnBrk="0" hangingPunct="1">
-              <a:lnSpc>
-                <a:spcPct val="90000"/>
-              </a:lnSpc>
-              <a:spcBef>
-                <a:spcPct val="0"/>
-              </a:spcBef>
-              <a:buNone/>
-              <a:defRPr sz="6000" kern="1200">
-                <a:solidFill>
-                  <a:schemeClr val="tx1"/>
-                </a:solidFill>
-                <a:latin typeface="+mj-lt"/>
-                <a:ea typeface="+mj-ea"/>
-                <a:cs typeface="+mj-cs"/>
-              </a:defRPr>
-            </a:lvl1pPr>
-          </a:lstStyle>
-          <a:p>
-            <a:r>
-              <a:rPr lang="en-US" sz="2000" dirty="0"/>
-              <a:t>Custom-built machinery and third-party equipment  are heterogenous system</a:t>
-            </a:r>
-          </a:p>
-          <a:p>
-            <a:r>
-              <a:rPr lang="en-US" sz="2000" dirty="0"/>
-              <a:t>Integrating into heterogenous system is complex</a:t>
-            </a:r>
-          </a:p>
-          <a:p>
-            <a:r>
-              <a:rPr lang="en-US" sz="2000" dirty="0"/>
-              <a:t>Different data format</a:t>
-            </a:r>
-          </a:p>
-        </p:txBody>
-      </p:sp>
-      <p:sp>
-        <p:nvSpPr>
-          <p:cNvPr id="9" name="Title 1">
-            <a:extLst>
-              <a:ext uri="{FF2B5EF4-FFF2-40B4-BE49-F238E27FC236}">
-                <a16:creationId xmlns:a16="http://schemas.microsoft.com/office/drawing/2014/main" id="{AE7893FC-860B-8085-4328-201C9DFC5A8B}"/>
-              </a:ext>
-            </a:extLst>
-          </p:cNvPr>
-          <p:cNvSpPr txBox="1">
-            <a:spLocks/>
-          </p:cNvSpPr>
+      </p:pic>
+      <p:pic>
+        <p:nvPicPr>
+          <p:cNvPr id="18" name="Graphic 17" descr="Arrow: Straight with solid fill">
+            <a:extLst>
+              <a:ext uri="{FF2B5EF4-FFF2-40B4-BE49-F238E27FC236}">
+                <a16:creationId xmlns:a16="http://schemas.microsoft.com/office/drawing/2014/main" id="{7F5BEA57-0B7C-EFA4-2F96-C21C189AA1E1}"/>
+              </a:ext>
+            </a:extLst>
+          </p:cNvPr>
+          <p:cNvPicPr>
+            <a:picLocks noChangeAspect="1"/>
+          </p:cNvPicPr>
           <p:nvPr/>
-        </p:nvSpPr>
+        </p:nvPicPr>
+        <p:blipFill>
+          <a:blip r:embed="rId3">
+            <a:extLst>
+              <a:ext uri="{28A0092B-C50C-407E-A947-70E740481C1C}">
+                <a14:useLocalDpi xmlns:a14="http://schemas.microsoft.com/office/drawing/2010/main" val="0"/>
+              </a:ext>
+              <a:ext uri="{96DAC541-7B7A-43D3-8B79-37D633B846F1}">
+                <asvg:svgBlip xmlns:asvg="http://schemas.microsoft.com/office/drawing/2016/SVG/main" r:embed="rId4"/>
+              </a:ext>
+            </a:extLst>
+          </a:blip>
+          <a:stretch>
+            <a:fillRect/>
+          </a:stretch>
+        </p:blipFill>
         <p:spPr>
-          <a:xfrm>
-            <a:off x="782522" y="5249643"/>
-            <a:ext cx="6494578" cy="443000"/>
+          <a:xfrm rot="10800000">
+            <a:off x="647064" y="3040247"/>
+            <a:ext cx="486407" cy="486407"/>
           </a:xfrm>
           <a:prstGeom prst="rect">
             <a:avLst/>
           </a:prstGeom>
         </p:spPr>
-        <p:txBody>
-          <a:bodyPr vert="horz" lIns="91440" tIns="45720" rIns="91440" bIns="45720" rtlCol="0" anchor="b">
-            <a:noAutofit/>
-          </a:bodyPr>
-          <a:lstStyle>
-            <a:lvl1pPr algn="ctr" defTabSz="914400" rtl="0" eaLnBrk="1" latinLnBrk="0" hangingPunct="1">
-              <a:lnSpc>
-                <a:spcPct val="90000"/>
-              </a:lnSpc>
-              <a:spcBef>
-                <a:spcPct val="0"/>
-              </a:spcBef>
-              <a:buNone/>
-              <a:defRPr sz="6000" kern="1200">
-                <a:solidFill>
-                  <a:schemeClr val="tx1"/>
-                </a:solidFill>
-                <a:latin typeface="+mj-lt"/>
-                <a:ea typeface="+mj-ea"/>
-                <a:cs typeface="+mj-cs"/>
-              </a:defRPr>
-            </a:lvl1pPr>
-          </a:lstStyle>
-          <a:p>
-            <a:r>
-              <a:rPr lang="en-US" sz="1800" dirty="0"/>
-              <a:t>DT relies on high quality real-time data</a:t>
-            </a:r>
-          </a:p>
-          <a:p>
-            <a:r>
-              <a:rPr lang="en-US" sz="1800" dirty="0"/>
-              <a:t>Dust. Vibration and temperature affect sensor reliability</a:t>
-            </a:r>
-          </a:p>
-        </p:txBody>
-      </p:sp>
+      </p:pic>
+      <p:pic>
+        <p:nvPicPr>
+          <p:cNvPr id="19" name="Graphic 18" descr="Arrow: Straight with solid fill">
+            <a:extLst>
+              <a:ext uri="{FF2B5EF4-FFF2-40B4-BE49-F238E27FC236}">
+                <a16:creationId xmlns:a16="http://schemas.microsoft.com/office/drawing/2014/main" id="{FEC80AFB-6FDD-9FE0-6316-AE9BFCF838F4}"/>
+              </a:ext>
+            </a:extLst>
+          </p:cNvPr>
+          <p:cNvPicPr>
+            <a:picLocks noChangeAspect="1"/>
+          </p:cNvPicPr>
+          <p:nvPr/>
+        </p:nvPicPr>
+        <p:blipFill>
+          <a:blip r:embed="rId3">
+            <a:extLst>
+              <a:ext uri="{28A0092B-C50C-407E-A947-70E740481C1C}">
+                <a14:useLocalDpi xmlns:a14="http://schemas.microsoft.com/office/drawing/2010/main" val="0"/>
+              </a:ext>
+              <a:ext uri="{96DAC541-7B7A-43D3-8B79-37D633B846F1}">
+                <asvg:svgBlip xmlns:asvg="http://schemas.microsoft.com/office/drawing/2016/SVG/main" r:embed="rId4"/>
+              </a:ext>
+            </a:extLst>
+          </a:blip>
+          <a:stretch>
+            <a:fillRect/>
+          </a:stretch>
+        </p:blipFill>
+        <p:spPr>
+          <a:xfrm rot="10800000">
+            <a:off x="647063" y="3903661"/>
+            <a:ext cx="486407" cy="486407"/>
+          </a:xfrm>
+          <a:prstGeom prst="rect">
+            <a:avLst/>
+          </a:prstGeom>
+        </p:spPr>
+      </p:pic>
+      <p:pic>
+        <p:nvPicPr>
+          <p:cNvPr id="20" name="Graphic 19" descr="Arrow: Straight with solid fill">
+            <a:extLst>
+              <a:ext uri="{FF2B5EF4-FFF2-40B4-BE49-F238E27FC236}">
+                <a16:creationId xmlns:a16="http://schemas.microsoft.com/office/drawing/2014/main" id="{BDE72B9A-BE9F-438F-A315-4053E45BEC8E}"/>
+              </a:ext>
+            </a:extLst>
+          </p:cNvPr>
+          <p:cNvPicPr>
+            <a:picLocks noChangeAspect="1"/>
+          </p:cNvPicPr>
+          <p:nvPr/>
+        </p:nvPicPr>
+        <p:blipFill>
+          <a:blip r:embed="rId3">
+            <a:extLst>
+              <a:ext uri="{28A0092B-C50C-407E-A947-70E740481C1C}">
+                <a14:useLocalDpi xmlns:a14="http://schemas.microsoft.com/office/drawing/2010/main" val="0"/>
+              </a:ext>
+              <a:ext uri="{96DAC541-7B7A-43D3-8B79-37D633B846F1}">
+                <asvg:svgBlip xmlns:asvg="http://schemas.microsoft.com/office/drawing/2016/SVG/main" r:embed="rId4"/>
+              </a:ext>
+            </a:extLst>
+          </a:blip>
+          <a:stretch>
+            <a:fillRect/>
+          </a:stretch>
+        </p:blipFill>
+        <p:spPr>
+          <a:xfrm rot="10800000">
+            <a:off x="647062" y="4767075"/>
+            <a:ext cx="486407" cy="486407"/>
+          </a:xfrm>
+          <a:prstGeom prst="rect">
+            <a:avLst/>
+          </a:prstGeom>
+        </p:spPr>
+      </p:pic>
+      <p:pic>
+        <p:nvPicPr>
+          <p:cNvPr id="21" name="Graphic 20" descr="Arrow: Straight with solid fill">
+            <a:extLst>
+              <a:ext uri="{FF2B5EF4-FFF2-40B4-BE49-F238E27FC236}">
+                <a16:creationId xmlns:a16="http://schemas.microsoft.com/office/drawing/2014/main" id="{DCDF91C2-FB68-DF7B-D123-29211EECEFA7}"/>
+              </a:ext>
+            </a:extLst>
+          </p:cNvPr>
+          <p:cNvPicPr>
+            <a:picLocks noChangeAspect="1"/>
+          </p:cNvPicPr>
+          <p:nvPr/>
+        </p:nvPicPr>
+        <p:blipFill>
+          <a:blip r:embed="rId3">
+            <a:extLst>
+              <a:ext uri="{28A0092B-C50C-407E-A947-70E740481C1C}">
+                <a14:useLocalDpi xmlns:a14="http://schemas.microsoft.com/office/drawing/2010/main" val="0"/>
+              </a:ext>
+              <a:ext uri="{96DAC541-7B7A-43D3-8B79-37D633B846F1}">
+                <asvg:svgBlip xmlns:asvg="http://schemas.microsoft.com/office/drawing/2016/SVG/main" r:embed="rId4"/>
+              </a:ext>
+            </a:extLst>
+          </a:blip>
+          <a:stretch>
+            <a:fillRect/>
+          </a:stretch>
+        </p:blipFill>
+        <p:spPr>
+          <a:xfrm rot="10800000">
+            <a:off x="647061" y="5630489"/>
+            <a:ext cx="486407" cy="486407"/>
+          </a:xfrm>
+          <a:prstGeom prst="rect">
+            <a:avLst/>
+          </a:prstGeom>
+        </p:spPr>
+      </p:pic>
     </p:spTree>
     <p:extLst>
       <p:ext uri="{BB962C8B-B14F-4D97-AF65-F5344CB8AC3E}">
-        <p14:creationId xmlns:p14="http://schemas.microsoft.com/office/powerpoint/2010/main" val="2247747237"/>
+        <p14:creationId xmlns:p14="http://schemas.microsoft.com/office/powerpoint/2010/main" val="2732867836"/>
       </p:ext>
     </p:extLst>
   </p:cSld>
@@ -9561,7 +9813,7 @@
 </p:sld>
 </file>
 
-<file path=ppt/slides/slide13.xml><?xml version="1.0" encoding="utf-8"?>
+<file path=ppt/slides/slide12.xml><?xml version="1.0" encoding="utf-8"?>
 <p:sld xmlns:a="http://schemas.openxmlformats.org/drawingml/2006/main" xmlns:r="http://schemas.openxmlformats.org/officeDocument/2006/relationships" xmlns:p="http://schemas.openxmlformats.org/presentationml/2006/main">
   <p:cSld>
     <p:bg>
@@ -9574,7 +9826,7 @@
         <p:cNvPr id="1" name="">
           <a:extLst>
             <a:ext uri="{FF2B5EF4-FFF2-40B4-BE49-F238E27FC236}">
-              <a16:creationId xmlns:a16="http://schemas.microsoft.com/office/drawing/2014/main" id="{D53537D8-3888-0ED3-F5D8-53B160591346}"/>
+              <a16:creationId xmlns:a16="http://schemas.microsoft.com/office/drawing/2014/main" id="{17FFD8CC-6330-0215-2626-BB490523DEF1}"/>
             </a:ext>
           </a:extLst>
         </p:cNvPr>
@@ -9594,7 +9846,7 @@
           <p:cNvPr id="2" name="Title 1">
             <a:extLst>
               <a:ext uri="{FF2B5EF4-FFF2-40B4-BE49-F238E27FC236}">
-                <a16:creationId xmlns:a16="http://schemas.microsoft.com/office/drawing/2014/main" id="{56DEC606-C078-0516-9D70-04207B635E78}"/>
+                <a16:creationId xmlns:a16="http://schemas.microsoft.com/office/drawing/2014/main" id="{1C3416F8-EF3C-BEF2-FF1E-B8C4C9B42D55}"/>
               </a:ext>
             </a:extLst>
           </p:cNvPr>
@@ -9607,235 +9859,202 @@
         </p:nvSpPr>
         <p:spPr>
           <a:xfrm>
-            <a:off x="1740130" y="919308"/>
-            <a:ext cx="9643947" cy="590550"/>
+            <a:off x="3473832" y="457707"/>
+            <a:ext cx="5244337" cy="592137"/>
           </a:xfrm>
         </p:spPr>
         <p:txBody>
           <a:bodyPr>
-            <a:noAutofit/>
+            <a:normAutofit/>
           </a:bodyPr>
           <a:lstStyle/>
           <a:p>
             <a:r>
-              <a:rPr lang="en-US" sz="3200" dirty="0"/>
-              <a:t>Addressing the Challenges using AI and Data Science</a:t>
+              <a:rPr lang="en-US" sz="3200" b="1" dirty="0"/>
+              <a:t>Business Recommendation</a:t>
             </a:r>
           </a:p>
         </p:txBody>
       </p:sp>
-      <p:sp>
-        <p:nvSpPr>
-          <p:cNvPr id="4" name="Title 1">
-            <a:extLst>
-              <a:ext uri="{FF2B5EF4-FFF2-40B4-BE49-F238E27FC236}">
-                <a16:creationId xmlns:a16="http://schemas.microsoft.com/office/drawing/2014/main" id="{F892114F-622B-27F0-5CDD-6A6327A01E90}"/>
-              </a:ext>
-            </a:extLst>
-          </p:cNvPr>
-          <p:cNvSpPr txBox="1">
-            <a:spLocks/>
-          </p:cNvSpPr>
+      <p:pic>
+        <p:nvPicPr>
+          <p:cNvPr id="3" name="Graphic 98" descr="Handshake">
+            <a:extLst>
+              <a:ext uri="{FF2B5EF4-FFF2-40B4-BE49-F238E27FC236}">
+                <a16:creationId xmlns:a16="http://schemas.microsoft.com/office/drawing/2014/main" id="{917169CE-AAF4-14F4-B3CE-F5973DA79104}"/>
+              </a:ext>
+            </a:extLst>
+          </p:cNvPr>
+          <p:cNvPicPr>
+            <a:picLocks noChangeAspect="1"/>
+          </p:cNvPicPr>
           <p:nvPr/>
-        </p:nvSpPr>
+        </p:nvPicPr>
+        <p:blipFill>
+          <a:blip r:embed="rId3">
+            <a:extLst>
+              <a:ext uri="{28A0092B-C50C-407E-A947-70E740481C1C}">
+                <a14:useLocalDpi xmlns:a14="http://schemas.microsoft.com/office/drawing/2010/main" val="0"/>
+              </a:ext>
+              <a:ext uri="{96DAC541-7B7A-43D3-8B79-37D633B846F1}">
+                <asvg:svgBlip xmlns:asvg="http://schemas.microsoft.com/office/drawing/2016/SVG/main" r:embed="rId4"/>
+              </a:ext>
+            </a:extLst>
+          </a:blip>
+          <a:stretch>
+            <a:fillRect/>
+          </a:stretch>
+        </p:blipFill>
         <p:spPr>
           <a:xfrm>
-            <a:off x="1428749" y="1526564"/>
-            <a:ext cx="4171950" cy="591733"/>
+            <a:off x="831194" y="721790"/>
+            <a:ext cx="4645848" cy="4645848"/>
           </a:xfrm>
           <a:prstGeom prst="rect">
             <a:avLst/>
           </a:prstGeom>
         </p:spPr>
-        <p:txBody>
-          <a:bodyPr vert="horz" lIns="91440" tIns="45720" rIns="91440" bIns="45720" rtlCol="0" anchor="b">
-            <a:noAutofit/>
-          </a:bodyPr>
-          <a:lstStyle>
-            <a:lvl1pPr algn="ctr" defTabSz="914400" rtl="0" eaLnBrk="1" latinLnBrk="0" hangingPunct="1">
-              <a:lnSpc>
-                <a:spcPct val="90000"/>
-              </a:lnSpc>
-              <a:spcBef>
-                <a:spcPct val="0"/>
-              </a:spcBef>
-              <a:buNone/>
-              <a:defRPr sz="6000" kern="1200">
-                <a:solidFill>
-                  <a:schemeClr val="tx1"/>
-                </a:solidFill>
-                <a:latin typeface="+mj-lt"/>
-                <a:ea typeface="+mj-ea"/>
-                <a:cs typeface="+mj-cs"/>
-              </a:defRPr>
-            </a:lvl1pPr>
-          </a:lstStyle>
-          <a:p>
-            <a:r>
-              <a:rPr lang="en-US" sz="2000" dirty="0"/>
-              <a:t>Integration with existing system</a:t>
-            </a:r>
-          </a:p>
-        </p:txBody>
-      </p:sp>
-      <p:sp>
-        <p:nvSpPr>
-          <p:cNvPr id="3" name="Title 1">
-            <a:extLst>
-              <a:ext uri="{FF2B5EF4-FFF2-40B4-BE49-F238E27FC236}">
-                <a16:creationId xmlns:a16="http://schemas.microsoft.com/office/drawing/2014/main" id="{2E628298-4256-E739-708A-AB27ADA2EB69}"/>
-              </a:ext>
-            </a:extLst>
-          </p:cNvPr>
-          <p:cNvSpPr txBox="1">
-            <a:spLocks/>
-          </p:cNvSpPr>
+      </p:pic>
+      <p:sp>
+        <p:nvSpPr>
+          <p:cNvPr id="8" name="TextBox 7">
+            <a:extLst>
+              <a:ext uri="{FF2B5EF4-FFF2-40B4-BE49-F238E27FC236}">
+                <a16:creationId xmlns:a16="http://schemas.microsoft.com/office/drawing/2014/main" id="{779399F8-8B2B-2BF9-9D1E-1E8DCE064C19}"/>
+              </a:ext>
+            </a:extLst>
+          </p:cNvPr>
+          <p:cNvSpPr txBox="1"/>
           <p:nvPr/>
         </p:nvSpPr>
         <p:spPr>
           <a:xfrm>
-            <a:off x="1428749" y="3429000"/>
-            <a:ext cx="4171950" cy="591733"/>
+            <a:off x="1662334" y="4982917"/>
+            <a:ext cx="2983568" cy="769441"/>
           </a:xfrm>
           <a:prstGeom prst="rect">
             <a:avLst/>
           </a:prstGeom>
+          <a:noFill/>
         </p:spPr>
         <p:txBody>
-          <a:bodyPr vert="horz" lIns="91440" tIns="45720" rIns="91440" bIns="45720" rtlCol="0" anchor="b">
-            <a:noAutofit/>
+          <a:bodyPr wrap="square" rtlCol="0">
+            <a:spAutoFit/>
           </a:bodyPr>
-          <a:lstStyle>
-            <a:lvl1pPr algn="ctr" defTabSz="914400" rtl="0" eaLnBrk="1" latinLnBrk="0" hangingPunct="1">
-              <a:lnSpc>
-                <a:spcPct val="90000"/>
-              </a:lnSpc>
-              <a:spcBef>
-                <a:spcPct val="0"/>
-              </a:spcBef>
-              <a:buNone/>
-              <a:defRPr sz="6000" kern="1200">
-                <a:solidFill>
-                  <a:schemeClr val="tx1"/>
-                </a:solidFill>
-                <a:latin typeface="+mj-lt"/>
-                <a:ea typeface="+mj-ea"/>
-                <a:cs typeface="+mj-cs"/>
-              </a:defRPr>
-            </a:lvl1pPr>
-          </a:lstStyle>
+          <a:lstStyle/>
           <a:p>
             <a:r>
-              <a:rPr lang="en-US" sz="2000" dirty="0"/>
-              <a:t>Data Collection and Quality</a:t>
+              <a:rPr lang="en-US" sz="4400" b="1" dirty="0"/>
+              <a:t>Thank You</a:t>
             </a:r>
           </a:p>
         </p:txBody>
       </p:sp>
       <p:sp>
         <p:nvSpPr>
-          <p:cNvPr id="5" name="Title 1">
-            <a:extLst>
-              <a:ext uri="{FF2B5EF4-FFF2-40B4-BE49-F238E27FC236}">
-                <a16:creationId xmlns:a16="http://schemas.microsoft.com/office/drawing/2014/main" id="{4108C05D-13B0-5351-42FF-559E0A4FC3F5}"/>
-              </a:ext>
-            </a:extLst>
-          </p:cNvPr>
-          <p:cNvSpPr txBox="1">
-            <a:spLocks/>
-          </p:cNvSpPr>
+          <p:cNvPr id="10" name="TextBox 9">
+            <a:extLst>
+              <a:ext uri="{FF2B5EF4-FFF2-40B4-BE49-F238E27FC236}">
+                <a16:creationId xmlns:a16="http://schemas.microsoft.com/office/drawing/2014/main" id="{3009EA79-039D-38A8-67E1-519045F9377C}"/>
+              </a:ext>
+            </a:extLst>
+          </p:cNvPr>
+          <p:cNvSpPr txBox="1"/>
           <p:nvPr/>
         </p:nvSpPr>
         <p:spPr>
           <a:xfrm>
-            <a:off x="1997306" y="4231213"/>
-            <a:ext cx="6937144" cy="425690"/>
+            <a:off x="6287677" y="1703178"/>
+            <a:ext cx="3075398" cy="400110"/>
           </a:xfrm>
           <a:prstGeom prst="rect">
             <a:avLst/>
           </a:prstGeom>
+          <a:noFill/>
         </p:spPr>
         <p:txBody>
-          <a:bodyPr vert="horz" lIns="91440" tIns="45720" rIns="91440" bIns="45720" rtlCol="0" anchor="b">
-            <a:noAutofit/>
+          <a:bodyPr wrap="square" rtlCol="0">
+            <a:spAutoFit/>
           </a:bodyPr>
-          <a:lstStyle>
-            <a:lvl1pPr algn="ctr" defTabSz="914400" rtl="0" eaLnBrk="1" latinLnBrk="0" hangingPunct="1">
-              <a:lnSpc>
-                <a:spcPct val="90000"/>
-              </a:lnSpc>
-              <a:spcBef>
-                <a:spcPct val="0"/>
-              </a:spcBef>
-              <a:buNone/>
-              <a:defRPr sz="6000" kern="1200">
-                <a:solidFill>
-                  <a:schemeClr val="tx1"/>
-                </a:solidFill>
-                <a:latin typeface="+mj-lt"/>
-                <a:ea typeface="+mj-ea"/>
-                <a:cs typeface="+mj-cs"/>
-              </a:defRPr>
-            </a:lvl1pPr>
-          </a:lstStyle>
+          <a:lstStyle/>
           <a:p>
             <a:r>
-              <a:rPr lang="en-US" sz="2000" dirty="0"/>
-              <a:t>Use advanced analytics and AI to clean and structure data</a:t>
+              <a:rPr lang="en-US" sz="2000" b="1" dirty="0"/>
+              <a:t>Project Code and Slide:</a:t>
             </a:r>
           </a:p>
         </p:txBody>
       </p:sp>
-      <p:sp>
-        <p:nvSpPr>
-          <p:cNvPr id="7" name="Title 1">
-            <a:extLst>
-              <a:ext uri="{FF2B5EF4-FFF2-40B4-BE49-F238E27FC236}">
-                <a16:creationId xmlns:a16="http://schemas.microsoft.com/office/drawing/2014/main" id="{32FBF90D-0D11-677B-E63D-09A397415F07}"/>
-              </a:ext>
-            </a:extLst>
-          </p:cNvPr>
-          <p:cNvSpPr txBox="1">
-            <a:spLocks/>
-          </p:cNvSpPr>
+      <p:cxnSp>
+        <p:nvCxnSpPr>
+          <p:cNvPr id="12" name="Straight Connector 11">
+            <a:extLst>
+              <a:ext uri="{FF2B5EF4-FFF2-40B4-BE49-F238E27FC236}">
+                <a16:creationId xmlns:a16="http://schemas.microsoft.com/office/drawing/2014/main" id="{1E02D710-71C0-07CD-F190-EE8FC3312164}"/>
+              </a:ext>
+            </a:extLst>
+          </p:cNvPr>
+          <p:cNvCxnSpPr>
+            <a:cxnSpLocks/>
+          </p:cNvCxnSpPr>
           <p:nvPr/>
-        </p:nvSpPr>
+        </p:nvCxnSpPr>
         <p:spPr>
           <a:xfrm>
-            <a:off x="1787756" y="2135003"/>
-            <a:ext cx="9223144" cy="425690"/>
+            <a:off x="6137462" y="1281123"/>
+            <a:ext cx="0" cy="4817636"/>
+          </a:xfrm>
+          <a:prstGeom prst="line">
+            <a:avLst/>
+          </a:prstGeom>
+          <a:ln/>
+        </p:spPr>
+        <p:style>
+          <a:lnRef idx="3">
+            <a:schemeClr val="accent2"/>
+          </a:lnRef>
+          <a:fillRef idx="0">
+            <a:schemeClr val="accent2"/>
+          </a:fillRef>
+          <a:effectRef idx="2">
+            <a:schemeClr val="accent2"/>
+          </a:effectRef>
+          <a:fontRef idx="minor">
+            <a:schemeClr val="tx1"/>
+          </a:fontRef>
+        </p:style>
+      </p:cxnSp>
+      <p:sp>
+        <p:nvSpPr>
+          <p:cNvPr id="23" name="TextBox 22">
+            <a:extLst>
+              <a:ext uri="{FF2B5EF4-FFF2-40B4-BE49-F238E27FC236}">
+                <a16:creationId xmlns:a16="http://schemas.microsoft.com/office/drawing/2014/main" id="{EE9A75F2-CC1E-B229-F145-7AF0555DDFB8}"/>
+              </a:ext>
+            </a:extLst>
+          </p:cNvPr>
+          <p:cNvSpPr txBox="1"/>
+          <p:nvPr/>
+        </p:nvSpPr>
+        <p:spPr>
+          <a:xfrm>
+            <a:off x="6637523" y="2223162"/>
+            <a:ext cx="5056596" cy="338554"/>
           </a:xfrm>
           <a:prstGeom prst="rect">
             <a:avLst/>
           </a:prstGeom>
+          <a:noFill/>
         </p:spPr>
         <p:txBody>
-          <a:bodyPr vert="horz" lIns="91440" tIns="45720" rIns="91440" bIns="45720" rtlCol="0" anchor="b">
-            <a:noAutofit/>
+          <a:bodyPr wrap="square" rtlCol="0">
+            <a:spAutoFit/>
           </a:bodyPr>
-          <a:lstStyle>
-            <a:lvl1pPr algn="ctr" defTabSz="914400" rtl="0" eaLnBrk="1" latinLnBrk="0" hangingPunct="1">
-              <a:lnSpc>
-                <a:spcPct val="90000"/>
-              </a:lnSpc>
-              <a:spcBef>
-                <a:spcPct val="0"/>
-              </a:spcBef>
-              <a:buNone/>
-              <a:defRPr sz="6000" kern="1200">
-                <a:solidFill>
-                  <a:schemeClr val="tx1"/>
-                </a:solidFill>
-                <a:latin typeface="+mj-lt"/>
-                <a:ea typeface="+mj-ea"/>
-                <a:cs typeface="+mj-cs"/>
-              </a:defRPr>
-            </a:lvl1pPr>
-          </a:lstStyle>
+          <a:lstStyle/>
           <a:p>
             <a:r>
-              <a:rPr lang="en-US" sz="2000" dirty="0"/>
-              <a:t>extract, transform, and load data into a unified format suitable for the digital twin model</a:t>
+              <a:rPr lang="en-US" sz="1600" b="1" dirty="0"/>
+              <a:t>https://github.com/Kazeem-Bello/customer_chun/</a:t>
             </a:r>
           </a:p>
         </p:txBody>
@@ -9843,7 +10062,7 @@
     </p:spTree>
     <p:extLst>
       <p:ext uri="{BB962C8B-B14F-4D97-AF65-F5344CB8AC3E}">
-        <p14:creationId xmlns:p14="http://schemas.microsoft.com/office/powerpoint/2010/main" val="3186575872"/>
+        <p14:creationId xmlns:p14="http://schemas.microsoft.com/office/powerpoint/2010/main" val="1313903728"/>
       </p:ext>
     </p:extLst>
   </p:cSld>
@@ -9899,7 +10118,7 @@
         </p:nvSpPr>
         <p:spPr>
           <a:xfrm>
-            <a:off x="4890263" y="457707"/>
+            <a:off x="4902994" y="457707"/>
             <a:ext cx="2386013" cy="592137"/>
           </a:xfrm>
         </p:spPr>
@@ -10318,7 +10537,7 @@
         </p:nvSpPr>
         <p:spPr>
           <a:xfrm>
-            <a:off x="4584166" y="457707"/>
+            <a:off x="4159632" y="457707"/>
             <a:ext cx="3872737" cy="592137"/>
           </a:xfrm>
         </p:spPr>
@@ -10887,7 +11106,7 @@
         </p:nvSpPr>
         <p:spPr>
           <a:xfrm>
-            <a:off x="4890263" y="457707"/>
+            <a:off x="4902994" y="457707"/>
             <a:ext cx="2386013" cy="592137"/>
           </a:xfrm>
         </p:spPr>
@@ -11137,7 +11356,7 @@
         </p:nvSpPr>
         <p:spPr>
           <a:xfrm>
-            <a:off x="4890263" y="457707"/>
+            <a:off x="4902994" y="457707"/>
             <a:ext cx="2386013" cy="592137"/>
           </a:xfrm>
         </p:spPr>
@@ -11387,7 +11606,7 @@
         </p:nvSpPr>
         <p:spPr>
           <a:xfrm>
-            <a:off x="4890263" y="457707"/>
+            <a:off x="4902994" y="457707"/>
             <a:ext cx="2386013" cy="592137"/>
           </a:xfrm>
         </p:spPr>
@@ -11747,8 +11966,8 @@
         </p:nvSpPr>
         <p:spPr>
           <a:xfrm>
-            <a:off x="4112805" y="415626"/>
-            <a:ext cx="3756763" cy="584775"/>
+            <a:off x="4217619" y="415626"/>
+            <a:ext cx="3440481" cy="584775"/>
           </a:xfrm>
           <a:prstGeom prst="rect">
             <a:avLst/>
@@ -11781,7 +12000,7 @@
           <p:nvPr>
             <p:extLst>
               <p:ext uri="{D42A27DB-BD31-4B8C-83A1-F6EECF244321}">
-                <p14:modId xmlns:p14="http://schemas.microsoft.com/office/powerpoint/2010/main" val="2544550609"/>
+                <p14:modId xmlns:p14="http://schemas.microsoft.com/office/powerpoint/2010/main" val="2223770588"/>
               </p:ext>
             </p:extLst>
           </p:nvPr>
@@ -11965,7 +12184,7 @@
         </p:nvSpPr>
         <p:spPr>
           <a:xfrm>
-            <a:off x="4112805" y="415626"/>
+            <a:off x="3880440" y="415626"/>
             <a:ext cx="4431120" cy="584775"/>
           </a:xfrm>
           <a:prstGeom prst="rect">
@@ -12856,14 +13075,14 @@
           <p:nvPr>
             <p:extLst>
               <p:ext uri="{D42A27DB-BD31-4B8C-83A1-F6EECF244321}">
-                <p14:modId xmlns:p14="http://schemas.microsoft.com/office/powerpoint/2010/main" val="2400235412"/>
+                <p14:modId xmlns:p14="http://schemas.microsoft.com/office/powerpoint/2010/main" val="1058925477"/>
               </p:ext>
             </p:extLst>
           </p:nvPr>
         </p:nvGraphicFramePr>
         <p:xfrm>
-          <a:off x="5645146" y="1848658"/>
-          <a:ext cx="1898974" cy="2058804"/>
+          <a:off x="5581650" y="1848658"/>
+          <a:ext cx="1962470" cy="2058804"/>
         </p:xfrm>
         <a:graphic>
           <a:graphicData uri="http://schemas.openxmlformats.org/drawingml/2006/table">
@@ -12872,14 +13091,14 @@
                 <a:tableStyleId>{5C22544A-7EE6-4342-B048-85BDC9FD1C3A}</a:tableStyleId>
               </a:tblPr>
               <a:tblGrid>
-                <a:gridCol w="1070699">
+                <a:gridCol w="1106500">
                   <a:extLst>
                     <a:ext uri="{9D8B030D-6E8A-4147-A177-3AD203B41FA5}">
                       <a16:colId xmlns:a16="http://schemas.microsoft.com/office/drawing/2014/main" val="3123014283"/>
                     </a:ext>
                   </a:extLst>
                 </a:gridCol>
-                <a:gridCol w="828275">
+                <a:gridCol w="855970">
                   <a:extLst>
                     <a:ext uri="{9D8B030D-6E8A-4147-A177-3AD203B41FA5}">
                       <a16:colId xmlns:a16="http://schemas.microsoft.com/office/drawing/2014/main" val="4267143154"/>
@@ -13362,8 +13581,8 @@
         </p:nvSpPr>
         <p:spPr>
           <a:xfrm>
-            <a:off x="4112805" y="415626"/>
-            <a:ext cx="4431120" cy="584775"/>
+            <a:off x="4156665" y="415626"/>
+            <a:ext cx="3878670" cy="584775"/>
           </a:xfrm>
           <a:prstGeom prst="rect">
             <a:avLst/>

</xml_diff>